<commit_message>
final work on Dashboard Presentation
</commit_message>
<xml_diff>
--- a/Jahresziele/2015/Dashboard/Dashboard.pptx
+++ b/Jahresziele/2015/Dashboard/Dashboard.pptx
@@ -5,7 +5,7 @@
     <p:sldMasterId id="2147483653" r:id="rId1"/>
   </p:sldMasterIdLst>
   <p:notesMasterIdLst>
-    <p:notesMasterId r:id="rId11"/>
+    <p:notesMasterId r:id="rId12"/>
   </p:notesMasterIdLst>
   <p:sldIdLst>
     <p:sldId id="256" r:id="rId2"/>
@@ -16,7 +16,8 @@
     <p:sldId id="261" r:id="rId7"/>
     <p:sldId id="262" r:id="rId8"/>
     <p:sldId id="263" r:id="rId9"/>
-    <p:sldId id="264" r:id="rId10"/>
+    <p:sldId id="265" r:id="rId10"/>
+    <p:sldId id="264" r:id="rId11"/>
   </p:sldIdLst>
   <p:sldSz cx="9144000" cy="5143500" type="screen16x9"/>
   <p:notesSz cx="6858000" cy="9144000"/>
@@ -385,7 +386,7 @@
     </p:spTree>
     <p:extLst>
       <p:ext uri="{BB962C8B-B14F-4D97-AF65-F5344CB8AC3E}">
-        <p14:creationId xmlns:p14="http://schemas.microsoft.com/office/powerpoint/2010/main" val="1907857566"/>
+        <p14:creationId xmlns:p14="http://schemas.microsoft.com/office/powerpoint/2010/main" xmlns="" val="1907857566"/>
       </p:ext>
     </p:extLst>
   </p:cSld>
@@ -541,7 +542,7 @@
           <a:p>
             <a:r>
               <a:rPr lang="de-DE" dirty="0" smtClean="0"/>
-              <a:t>Unsere neue Kunden Dashboard Homepage, auf der wir kundenbezogene Daten mit visuell ansprechenden Charts präsentieren können</a:t>
+              <a:t>Unsere neue Kunden Dashboard Homepage, auf der wir kundenbezogene Daten mit Charts visuell ansprechendend präsentieren können</a:t>
             </a:r>
           </a:p>
           <a:p>
@@ -550,7 +551,24 @@
           <a:p>
             <a:r>
               <a:rPr lang="de-DE" dirty="0" smtClean="0"/>
-              <a:t>Hier ein Kurzüberblick über die Features des neuen Tools</a:t>
+              <a:t>Bevor ich nun in den praktischen</a:t>
+            </a:r>
+            <a:r>
+              <a:rPr lang="de-DE" baseline="0" dirty="0" smtClean="0"/>
+              <a:t> Teil übergehe, </a:t>
+            </a:r>
+          </a:p>
+          <a:p>
+            <a:r>
+              <a:rPr lang="de-DE" baseline="0" dirty="0" smtClean="0"/>
+              <a:t>in dem ich Euch im Browser am offenen Herzen die Features live vorführe,</a:t>
+            </a:r>
+            <a:endParaRPr lang="de-DE" dirty="0" smtClean="0"/>
+          </a:p>
+          <a:p>
+            <a:r>
+              <a:rPr lang="de-DE" dirty="0" smtClean="0"/>
+              <a:t>hier ein Kurzüberblick über die Features des neuen Tools:</a:t>
             </a:r>
             <a:endParaRPr lang="de-DE" dirty="0"/>
           </a:p>
@@ -583,7 +601,130 @@
     </p:spTree>
     <p:extLst>
       <p:ext uri="{BB962C8B-B14F-4D97-AF65-F5344CB8AC3E}">
-        <p14:creationId xmlns:p14="http://schemas.microsoft.com/office/powerpoint/2010/main" val="325568466"/>
+        <p14:creationId xmlns:p14="http://schemas.microsoft.com/office/powerpoint/2010/main" xmlns="" val="325568466"/>
+      </p:ext>
+    </p:extLst>
+  </p:cSld>
+  <p:clrMapOvr>
+    <a:masterClrMapping/>
+  </p:clrMapOvr>
+</p:notes>
+</file>
+
+<file path=ppt/notesSlides/notesSlide10.xml><?xml version="1.0" encoding="utf-8"?>
+<p:notes xmlns:a="http://schemas.openxmlformats.org/drawingml/2006/main" xmlns:r="http://schemas.openxmlformats.org/officeDocument/2006/relationships" xmlns:p="http://schemas.openxmlformats.org/presentationml/2006/main">
+  <p:cSld>
+    <p:spTree>
+      <p:nvGrpSpPr>
+        <p:cNvPr id="1" name=""/>
+        <p:cNvGrpSpPr/>
+        <p:nvPr/>
+      </p:nvGrpSpPr>
+      <p:grpSpPr>
+        <a:xfrm>
+          <a:off x="0" y="0"/>
+          <a:ext cx="0" cy="0"/>
+          <a:chOff x="0" y="0"/>
+          <a:chExt cx="0" cy="0"/>
+        </a:xfrm>
+      </p:grpSpPr>
+      <p:sp>
+        <p:nvSpPr>
+          <p:cNvPr id="2" name="Folienbildplatzhalter 1"/>
+          <p:cNvSpPr>
+            <a:spLocks noGrp="1" noRot="1" noChangeAspect="1"/>
+          </p:cNvSpPr>
+          <p:nvPr>
+            <p:ph type="sldImg"/>
+          </p:nvPr>
+        </p:nvSpPr>
+        <p:spPr/>
+      </p:sp>
+      <p:sp>
+        <p:nvSpPr>
+          <p:cNvPr id="3" name="Notizenplatzhalter 2"/>
+          <p:cNvSpPr>
+            <a:spLocks noGrp="1"/>
+          </p:cNvSpPr>
+          <p:nvPr>
+            <p:ph type="body" idx="1"/>
+          </p:nvPr>
+        </p:nvSpPr>
+        <p:spPr/>
+        <p:txBody>
+          <a:bodyPr/>
+          <a:lstStyle/>
+          <a:p>
+            <a:r>
+              <a:rPr lang="de-DE" dirty="0" err="1" smtClean="0"/>
+              <a:t>Thanks</a:t>
+            </a:r>
+            <a:r>
+              <a:rPr lang="de-DE" dirty="0" smtClean="0"/>
+              <a:t> </a:t>
+            </a:r>
+            <a:r>
+              <a:rPr lang="de-DE" dirty="0" err="1" smtClean="0"/>
+              <a:t>for</a:t>
+            </a:r>
+            <a:r>
+              <a:rPr lang="de-DE" dirty="0" smtClean="0"/>
+              <a:t> </a:t>
+            </a:r>
+            <a:r>
+              <a:rPr lang="de-DE" dirty="0" smtClean="0"/>
+              <a:t>all + </a:t>
+            </a:r>
+            <a:r>
+              <a:rPr lang="de-DE" dirty="0" err="1" smtClean="0"/>
+              <a:t>Good</a:t>
+            </a:r>
+            <a:r>
+              <a:rPr lang="de-DE" smtClean="0"/>
+              <a:t> bye!</a:t>
+            </a:r>
+            <a:endParaRPr lang="de-DE" dirty="0"/>
+          </a:p>
+          <a:p>
+            <a:r>
+              <a:rPr lang="de-DE" dirty="0" smtClean="0"/>
+              <a:t/>
+            </a:r>
+            <a:br>
+              <a:rPr lang="de-DE" dirty="0" smtClean="0"/>
+            </a:br>
+            <a:endParaRPr lang="de-DE" dirty="0"/>
+          </a:p>
+        </p:txBody>
+      </p:sp>
+      <p:sp>
+        <p:nvSpPr>
+          <p:cNvPr id="4" name="Foliennummernplatzhalter 3"/>
+          <p:cNvSpPr>
+            <a:spLocks noGrp="1"/>
+          </p:cNvSpPr>
+          <p:nvPr>
+            <p:ph type="sldNum" sz="quarter" idx="10"/>
+          </p:nvPr>
+        </p:nvSpPr>
+        <p:spPr/>
+        <p:txBody>
+          <a:bodyPr/>
+          <a:lstStyle/>
+          <a:p>
+            <a:fld id="{CA5D3BF3-D352-46FC-8343-31F56E6730EA}" type="slidenum">
+              <a:rPr lang="de-DE" smtClean="0"/>
+              <a:pPr/>
+              <a:t>10</a:t>
+            </a:fld>
+            <a:endParaRPr lang="de-DE"/>
+          </a:p>
+        </p:txBody>
+      </p:sp>
+    </p:spTree>
+    <p:extLst>
+      <p:ext uri="{BB962C8B-B14F-4D97-AF65-F5344CB8AC3E}">
+        <p14:creationId xmlns:p14="http://schemas.microsoft.com/office/powerpoint/2010/main" xmlns="" val="1643596291"/>
       </p:ext>
     </p:extLst>
   </p:cSld>
@@ -639,7 +780,7 @@
           <a:p>
             <a:r>
               <a:rPr lang="de-DE" dirty="0" smtClean="0"/>
-              <a:t>Was war zunächst unser Anspruch an uns selbst bei der Gestaltung des Systems?</a:t>
+              <a:t>Was war zunächst der eigene Anspruch – also unser Anspruch an uns selbst bei der Gestaltung des Systems?</a:t>
             </a:r>
           </a:p>
           <a:p>
@@ -662,7 +803,7 @@
             </a:br>
             <a:r>
               <a:rPr lang="de-DE" dirty="0" smtClean="0"/>
-              <a:t>- Charts verschieben per </a:t>
+              <a:t>- Charts intuitiv verschieben per </a:t>
             </a:r>
             <a:r>
               <a:rPr lang="de-DE" dirty="0" err="1" smtClean="0"/>
@@ -677,7 +818,7 @@
             </a:br>
             <a:r>
               <a:rPr lang="de-DE" dirty="0" smtClean="0"/>
-              <a:t>- und sein Dashboard nach dem </a:t>
+              <a:t>- und dass der Kunde sein Dashboard nach dem </a:t>
             </a:r>
             <a:r>
               <a:rPr lang="de-DE" dirty="0" err="1" smtClean="0"/>
@@ -702,7 +843,14 @@
           <a:p>
             <a:r>
               <a:rPr lang="de-DE" dirty="0" smtClean="0"/>
-              <a:t>Leichte Administration für das PM – wir werden später noch sehen dass man das Dashboard mit nur einem Mausklick für einen Kunden aktivieren kann.</a:t>
+              <a:t>Eine leichte Administration für das PM </a:t>
+            </a:r>
+            <a:br>
+              <a:rPr lang="de-DE" dirty="0" smtClean="0"/>
+            </a:br>
+            <a:r>
+              <a:rPr lang="de-DE" dirty="0" smtClean="0"/>
+              <a:t>– wir werden später noch sehen dass man das Dashboard mit nur einem Mausklick für einen Kunden aktivieren kann.</a:t>
             </a:r>
           </a:p>
           <a:p>
@@ -711,7 +859,7 @@
           <a:p>
             <a:r>
               <a:rPr lang="de-DE" dirty="0" smtClean="0"/>
-              <a:t>Nahtlose Integration in unser User Berechtigungskonzept.</a:t>
+              <a:t>Ins selbe Horn stößt hier die nahtlose Integration in unser User Berechtigungskonzept.</a:t>
             </a:r>
             <a:br>
               <a:rPr lang="de-DE" dirty="0" smtClean="0"/>
@@ -774,7 +922,7 @@
     </p:spTree>
     <p:extLst>
       <p:ext uri="{BB962C8B-B14F-4D97-AF65-F5344CB8AC3E}">
-        <p14:creationId xmlns:p14="http://schemas.microsoft.com/office/powerpoint/2010/main" val="2279025156"/>
+        <p14:creationId xmlns:p14="http://schemas.microsoft.com/office/powerpoint/2010/main" xmlns="" val="2279025156"/>
       </p:ext>
     </p:extLst>
   </p:cSld>
@@ -863,7 +1011,7 @@
     </p:spTree>
     <p:extLst>
       <p:ext uri="{BB962C8B-B14F-4D97-AF65-F5344CB8AC3E}">
-        <p14:creationId xmlns:p14="http://schemas.microsoft.com/office/powerpoint/2010/main" val="1547411838"/>
+        <p14:creationId xmlns:p14="http://schemas.microsoft.com/office/powerpoint/2010/main" xmlns="" val="1547411838"/>
       </p:ext>
     </p:extLst>
   </p:cSld>
@@ -995,7 +1143,7 @@
     </p:spTree>
     <p:extLst>
       <p:ext uri="{BB962C8B-B14F-4D97-AF65-F5344CB8AC3E}">
-        <p14:creationId xmlns:p14="http://schemas.microsoft.com/office/powerpoint/2010/main" val="2477165898"/>
+        <p14:creationId xmlns:p14="http://schemas.microsoft.com/office/powerpoint/2010/main" xmlns="" val="2477165898"/>
       </p:ext>
     </p:extLst>
   </p:cSld>
@@ -1101,7 +1249,7 @@
     </p:spTree>
     <p:extLst>
       <p:ext uri="{BB962C8B-B14F-4D97-AF65-F5344CB8AC3E}">
-        <p14:creationId xmlns:p14="http://schemas.microsoft.com/office/powerpoint/2010/main" val="2005720128"/>
+        <p14:creationId xmlns:p14="http://schemas.microsoft.com/office/powerpoint/2010/main" xmlns="" val="2005720128"/>
       </p:ext>
     </p:extLst>
   </p:cSld>
@@ -1295,7 +1443,7 @@
     </p:spTree>
     <p:extLst>
       <p:ext uri="{BB962C8B-B14F-4D97-AF65-F5344CB8AC3E}">
-        <p14:creationId xmlns:p14="http://schemas.microsoft.com/office/powerpoint/2010/main" val="1643596291"/>
+        <p14:creationId xmlns:p14="http://schemas.microsoft.com/office/powerpoint/2010/main" xmlns="" val="1643596291"/>
       </p:ext>
     </p:extLst>
   </p:cSld>
@@ -1349,79 +1497,79 @@
           <a:bodyPr/>
           <a:lstStyle/>
           <a:p>
+            <a:pPr>
+              <a:buFontTx/>
+              <a:buChar char="-"/>
+            </a:pPr>
             <a:r>
               <a:rPr lang="de-DE" dirty="0" smtClean="0"/>
-              <a:t>Was war zunächst unser Anspruch an uns selbst bei der Gestaltung des Systems?</a:t>
-            </a:r>
-          </a:p>
-          <a:p>
-            <a:endParaRPr lang="de-DE" dirty="0"/>
-          </a:p>
-          <a:p>
+              <a:t> Intuitive Bedienung vorführen: Verschieben, ein- ausblenden, </a:t>
+            </a:r>
+            <a:r>
+              <a:rPr lang="de-DE" dirty="0" err="1" smtClean="0"/>
+              <a:t>Logout</a:t>
+            </a:r>
             <a:r>
               <a:rPr lang="de-DE" dirty="0" smtClean="0"/>
-              <a:t>In erster Linie sollte das Tool von unseren Kunden intuitiv zu bedienen sein, mit Standard Usability Features wie Charts ein- und ausblenden, Charts verschieben per </a:t>
-            </a:r>
-            <a:r>
-              <a:rPr lang="de-DE" dirty="0" err="1" smtClean="0"/>
-              <a:t>Drag&amp;Drop</a:t>
-            </a:r>
-            <a:r>
+              <a:t> + Login</a:t>
+            </a:r>
+            <a:br>
               <a:rPr lang="de-DE" dirty="0" smtClean="0"/>
-              <a:t>, </a:t>
-            </a:r>
-            <a:r>
-              <a:rPr lang="de-DE" dirty="0" err="1" smtClean="0"/>
-              <a:t>Persistierung</a:t>
-            </a:r>
+            </a:br>
             <a:endParaRPr lang="de-DE" dirty="0" smtClean="0"/>
           </a:p>
           <a:p>
-            <a:endParaRPr lang="de-DE" dirty="0"/>
-          </a:p>
-          <a:p>
+            <a:pPr>
+              <a:buFontTx/>
+              <a:buChar char="-"/>
+            </a:pPr>
             <a:r>
               <a:rPr lang="de-DE" dirty="0" smtClean="0"/>
-              <a:t>Leichte Administration für das PM – wir werden später noch sehen dass man das Dashboard mit nur einem Mausklick für einen Kunden aktivieren kann.</a:t>
-            </a:r>
-          </a:p>
-          <a:p>
-            <a:endParaRPr lang="de-DE" dirty="0"/>
-          </a:p>
-          <a:p>
+              <a:t> Kunden Administration:</a:t>
+            </a:r>
+            <a:r>
+              <a:rPr lang="de-DE" baseline="0" dirty="0" smtClean="0"/>
+              <a:t> </a:t>
+            </a:r>
             <a:r>
               <a:rPr lang="de-DE" dirty="0" smtClean="0"/>
-              <a:t>Nahtlose Integration in unser User Berechtigungskonzept.</a:t>
+              <a:t>On Click Aktivierung (</a:t>
+            </a:r>
+            <a:r>
+              <a:rPr lang="de-DE" dirty="0" err="1" smtClean="0"/>
+              <a:t>mjeatlas</a:t>
+            </a:r>
+            <a:r>
+              <a:rPr lang="de-DE" dirty="0" smtClean="0"/>
+              <a:t>)</a:t>
             </a:r>
             <a:br>
               <a:rPr lang="de-DE" dirty="0" smtClean="0"/>
             </a:br>
             <a:r>
               <a:rPr lang="de-DE" dirty="0" smtClean="0"/>
-              <a:t>Das heißt man muss die Charts nicht einzeln pro Kunde mühsam aktivieren, sondern weil jeder Chart einem Report zugeordnet ist, erscheint der  Chart voll automatisch im Dashboard, sobald ein Report für den Kunden aktiviert wird.</a:t>
-            </a:r>
-          </a:p>
-          <a:p>
-            <a:endParaRPr lang="de-DE" dirty="0"/>
-          </a:p>
-          <a:p>
-            <a:r>
-              <a:rPr lang="de-DE" dirty="0" smtClean="0"/>
-              <a:t>Last but not least:</a:t>
+              <a:t>   Dashboard zeigen!</a:t>
             </a:r>
             <a:br>
               <a:rPr lang="de-DE" dirty="0" smtClean="0"/>
             </a:br>
-            <a:r>
-              <a:rPr lang="de-DE" dirty="0" smtClean="0"/>
-              <a:t>Wir haben eine eigene kleine .NET API entwickelt, über die andere, also interne + externe Entwickler sich rasch in die Chart Programmierung einarbeiten können.</a:t>
+            <a:endParaRPr lang="de-DE" dirty="0" smtClean="0"/>
+          </a:p>
+          <a:p>
+            <a:pPr>
+              <a:buFontTx/>
+              <a:buChar char="-"/>
+            </a:pPr>
+            <a:r>
+              <a:rPr lang="de-DE" baseline="0" dirty="0" smtClean="0"/>
+              <a:t> Gruppe Atlas Leasing: ZBII Anwendung aktivieren</a:t>
             </a:r>
             <a:br>
-              <a:rPr lang="de-DE" dirty="0" smtClean="0"/>
+              <a:rPr lang="de-DE" baseline="0" dirty="0" smtClean="0"/>
             </a:br>
             <a:r>
-              <a:rPr lang="de-DE" dirty="0" smtClean="0"/>
-              <a:t>Mit dieser API ist ein Chart binnen 1 Stunde programmiert.</a:t>
+              <a:rPr lang="de-DE" baseline="0" dirty="0" smtClean="0"/>
+              <a:t>   Dashboard mit neuen Charts zeigen!</a:t>
             </a:r>
             <a:endParaRPr lang="de-DE" dirty="0"/>
           </a:p>
@@ -1454,7 +1602,7 @@
     </p:spTree>
     <p:extLst>
       <p:ext uri="{BB962C8B-B14F-4D97-AF65-F5344CB8AC3E}">
-        <p14:creationId xmlns:p14="http://schemas.microsoft.com/office/powerpoint/2010/main" val="2279025156"/>
+        <p14:creationId xmlns:p14="http://schemas.microsoft.com/office/powerpoint/2010/main" xmlns="" val="2279025156"/>
       </p:ext>
     </p:extLst>
   </p:cSld>
@@ -1510,24 +1658,7 @@
           <a:p>
             <a:r>
               <a:rPr lang="de-DE" dirty="0" smtClean="0"/>
-              <a:t>Ganz wichtig: Die Daten Transparenz!</a:t>
-            </a:r>
-          </a:p>
-          <a:p>
-            <a:endParaRPr lang="de-DE" dirty="0"/>
-          </a:p>
-          <a:p>
-            <a:r>
-              <a:rPr lang="de-DE" dirty="0" smtClean="0"/>
-              <a:t>Wenn ein User seinen Chart hinterfragen möchte, also wissen möchte aus welchen Details sich der Chart zusammensetzt, dann kann er direkt aus dem Chart in den zugehörigen Report gelangen und sich die Daten im Report </a:t>
-            </a:r>
-            <a:r>
-              <a:rPr lang="de-DE" dirty="0" err="1" smtClean="0"/>
-              <a:t>Grid</a:t>
-            </a:r>
-            <a:r>
-              <a:rPr lang="de-DE" dirty="0" smtClean="0"/>
-              <a:t> anzeigen lassen.</a:t>
+              <a:t>Report Anbindung vorführen!</a:t>
             </a:r>
             <a:endParaRPr lang="de-DE" dirty="0"/>
           </a:p>
@@ -1560,7 +1691,7 @@
     </p:spTree>
     <p:extLst>
       <p:ext uri="{BB962C8B-B14F-4D97-AF65-F5344CB8AC3E}">
-        <p14:creationId xmlns:p14="http://schemas.microsoft.com/office/powerpoint/2010/main" val="2005720128"/>
+        <p14:creationId xmlns:p14="http://schemas.microsoft.com/office/powerpoint/2010/main" xmlns="" val="2005720128"/>
       </p:ext>
     </p:extLst>
   </p:cSld>
@@ -1615,113 +1746,12 @@
           <a:lstStyle/>
           <a:p>
             <a:r>
-              <a:rPr lang="de-DE" dirty="0" err="1" smtClean="0"/>
-              <a:t>Thanks</a:t>
-            </a:r>
-            <a:r>
               <a:rPr lang="de-DE" dirty="0" smtClean="0"/>
-              <a:t> </a:t>
-            </a:r>
-            <a:r>
-              <a:rPr lang="de-DE" dirty="0" err="1" smtClean="0"/>
-              <a:t>for</a:t>
-            </a:r>
-            <a:r>
-              <a:rPr lang="de-DE" dirty="0" smtClean="0"/>
-              <a:t> all – so </a:t>
-            </a:r>
-            <a:r>
-              <a:rPr lang="de-DE" dirty="0" err="1" smtClean="0"/>
-              <a:t>far</a:t>
-            </a:r>
-            <a:r>
-              <a:rPr lang="de-DE" dirty="0" smtClean="0"/>
-              <a:t>….</a:t>
-            </a:r>
-          </a:p>
-          <a:p>
-            <a:endParaRPr lang="de-DE" dirty="0"/>
-          </a:p>
-          <a:p>
-            <a:r>
-              <a:rPr lang="de-DE" dirty="0" err="1" smtClean="0"/>
-              <a:t>Let‘s</a:t>
-            </a:r>
-            <a:r>
-              <a:rPr lang="de-DE" dirty="0" smtClean="0"/>
-              <a:t> </a:t>
-            </a:r>
-            <a:r>
-              <a:rPr lang="de-DE" dirty="0" err="1" smtClean="0"/>
-              <a:t>start</a:t>
-            </a:r>
-            <a:r>
-              <a:rPr lang="de-DE" dirty="0" smtClean="0"/>
-              <a:t> </a:t>
-            </a:r>
-            <a:r>
-              <a:rPr lang="de-DE" dirty="0" err="1" smtClean="0"/>
-              <a:t>the</a:t>
-            </a:r>
-            <a:r>
-              <a:rPr lang="de-DE" dirty="0" smtClean="0"/>
-              <a:t> </a:t>
-            </a:r>
-            <a:r>
-              <a:rPr lang="de-DE" dirty="0" err="1" smtClean="0"/>
-              <a:t>game</a:t>
-            </a:r>
-            <a:r>
-              <a:rPr lang="de-DE" dirty="0" smtClean="0"/>
-              <a:t> </a:t>
-            </a:r>
-            <a:r>
-              <a:rPr lang="de-DE" dirty="0" err="1" smtClean="0"/>
-              <a:t>now</a:t>
-            </a:r>
-            <a:r>
-              <a:rPr lang="de-DE" dirty="0" smtClean="0"/>
-              <a:t> </a:t>
-            </a:r>
-            <a:r>
-              <a:rPr lang="de-DE" dirty="0" err="1" smtClean="0"/>
-              <a:t>to</a:t>
-            </a:r>
-            <a:r>
-              <a:rPr lang="de-DE" dirty="0" smtClean="0"/>
-              <a:t> </a:t>
-            </a:r>
-            <a:r>
-              <a:rPr lang="de-DE" dirty="0" err="1" smtClean="0"/>
-              <a:t>dive</a:t>
-            </a:r>
-            <a:r>
-              <a:rPr lang="de-DE" dirty="0" smtClean="0"/>
-              <a:t> </a:t>
-            </a:r>
-            <a:r>
-              <a:rPr lang="de-DE" dirty="0" err="1" smtClean="0"/>
-              <a:t>deeper</a:t>
-            </a:r>
-            <a:r>
-              <a:rPr lang="de-DE" dirty="0" smtClean="0"/>
-              <a:t> </a:t>
-            </a:r>
-            <a:r>
-              <a:rPr lang="de-DE" dirty="0" err="1" smtClean="0"/>
-              <a:t>into</a:t>
-            </a:r>
-            <a:r>
-              <a:rPr lang="de-DE" dirty="0" smtClean="0"/>
-              <a:t> </a:t>
-            </a:r>
-            <a:r>
-              <a:rPr lang="de-DE" dirty="0" err="1" smtClean="0"/>
-              <a:t>practice</a:t>
-            </a:r>
-            <a:r>
-              <a:rPr lang="de-DE" dirty="0" smtClean="0"/>
-              <a:t> !</a:t>
+              <a:t>Kunden zum Schnuppern erwähnen, für den einen oder</a:t>
+            </a:r>
+            <a:r>
+              <a:rPr lang="de-DE" baseline="0" dirty="0" smtClean="0"/>
+              <a:t> anderen mal das Dashboard zeigen</a:t>
             </a:r>
             <a:endParaRPr lang="de-DE" dirty="0"/>
           </a:p>
@@ -1754,7 +1784,7 @@
     </p:spTree>
     <p:extLst>
       <p:ext uri="{BB962C8B-B14F-4D97-AF65-F5344CB8AC3E}">
-        <p14:creationId xmlns:p14="http://schemas.microsoft.com/office/powerpoint/2010/main" val="1643596291"/>
+        <p14:creationId xmlns:p14="http://schemas.microsoft.com/office/powerpoint/2010/main" xmlns="" val="2279025156"/>
       </p:ext>
     </p:extLst>
   </p:cSld>
@@ -1942,71 +1972,6 @@
           </a:p>
         </p:txBody>
       </p:sp>
-      <p:sp>
-        <p:nvSpPr>
-          <p:cNvPr id="4" name="Datumsplatzhalter 3"/>
-          <p:cNvSpPr>
-            <a:spLocks noGrp="1"/>
-          </p:cNvSpPr>
-          <p:nvPr>
-            <p:ph type="dt" sz="half" idx="10"/>
-          </p:nvPr>
-        </p:nvSpPr>
-        <p:spPr/>
-        <p:txBody>
-          <a:bodyPr/>
-          <a:lstStyle/>
-          <a:p>
-            <a:fld id="{DA13E788-B7EB-4A93-AB36-87ACFB4049A5}" type="datetimeFigureOut">
-              <a:rPr lang="de-DE" smtClean="0"/>
-              <a:t>09.10.2015</a:t>
-            </a:fld>
-            <a:endParaRPr lang="de-DE"/>
-          </a:p>
-        </p:txBody>
-      </p:sp>
-      <p:sp>
-        <p:nvSpPr>
-          <p:cNvPr id="5" name="Fußzeilenplatzhalter 4"/>
-          <p:cNvSpPr>
-            <a:spLocks noGrp="1"/>
-          </p:cNvSpPr>
-          <p:nvPr>
-            <p:ph type="ftr" sz="quarter" idx="11"/>
-          </p:nvPr>
-        </p:nvSpPr>
-        <p:spPr/>
-        <p:txBody>
-          <a:bodyPr/>
-          <a:lstStyle/>
-          <a:p>
-            <a:endParaRPr lang="de-DE"/>
-          </a:p>
-        </p:txBody>
-      </p:sp>
-      <p:sp>
-        <p:nvSpPr>
-          <p:cNvPr id="6" name="Foliennummernplatzhalter 5"/>
-          <p:cNvSpPr>
-            <a:spLocks noGrp="1"/>
-          </p:cNvSpPr>
-          <p:nvPr>
-            <p:ph type="sldNum" sz="quarter" idx="12"/>
-          </p:nvPr>
-        </p:nvSpPr>
-        <p:spPr/>
-        <p:txBody>
-          <a:bodyPr/>
-          <a:lstStyle/>
-          <a:p>
-            <a:fld id="{389DAAEF-2BAA-44E9-886D-34F630EEA82F}" type="slidenum">
-              <a:rPr lang="de-DE" smtClean="0"/>
-              <a:t>‹Nr.›</a:t>
-            </a:fld>
-            <a:endParaRPr lang="de-DE"/>
-          </a:p>
-        </p:txBody>
-      </p:sp>
     </p:spTree>
   </p:cSld>
   <p:clrMapOvr>
@@ -2046,6 +2011,123 @@
       </p:grpSpPr>
       <p:sp>
         <p:nvSpPr>
+          <p:cNvPr id="11" name="Textfeld 10"/>
+          <p:cNvSpPr txBox="1"/>
+          <p:nvPr userDrawn="1"/>
+        </p:nvSpPr>
+        <p:spPr>
+          <a:xfrm>
+            <a:off x="593632" y="4924690"/>
+            <a:ext cx="8082824" cy="338554"/>
+          </a:xfrm>
+          <a:prstGeom prst="rect">
+            <a:avLst/>
+          </a:prstGeom>
+          <a:noFill/>
+        </p:spPr>
+        <p:txBody>
+          <a:bodyPr wrap="square" rtlCol="0">
+            <a:spAutoFit/>
+          </a:bodyPr>
+          <a:lstStyle/>
+          <a:p>
+            <a:pPr marL="0" marR="0" lvl="0" indent="0" algn="r" defTabSz="914400" rtl="0" eaLnBrk="1" fontAlgn="auto" latinLnBrk="0" hangingPunct="1">
+              <a:lnSpc>
+                <a:spcPct val="100000"/>
+              </a:lnSpc>
+              <a:spcBef>
+                <a:spcPts val="0"/>
+              </a:spcBef>
+              <a:spcAft>
+                <a:spcPts val="0"/>
+              </a:spcAft>
+              <a:buClrTx/>
+              <a:buSzTx/>
+              <a:buFontTx/>
+              <a:buNone/>
+              <a:tabLst/>
+              <a:defRPr/>
+            </a:pPr>
+            <a:r>
+              <a:rPr lang="de-DE" sz="800" dirty="0" smtClean="0">
+                <a:solidFill>
+                  <a:schemeClr val="bg1">
+                    <a:lumMod val="50000"/>
+                  </a:schemeClr>
+                </a:solidFill>
+              </a:rPr>
+              <a:t>Matthias Jenzen,  Oktober 2015,  Seite </a:t>
+            </a:r>
+            <a:fld id="{8F82E0A0-C266-4798-8C8F-B9F91E9DA37E}" type="slidenum">
+              <a:rPr kumimoji="0" lang="de-DE" sz="800" b="0" i="0" u="none" strike="noStrike" kern="1200" cap="none" spc="0" normalizeH="0" baseline="0" noProof="0" smtClean="0">
+                <a:ln>
+                  <a:noFill/>
+                </a:ln>
+                <a:solidFill>
+                  <a:schemeClr val="bg1">
+                    <a:lumMod val="50000"/>
+                  </a:schemeClr>
+                </a:solidFill>
+                <a:effectLst/>
+                <a:uLnTx/>
+                <a:uFillTx/>
+                <a:latin typeface="+mn-lt"/>
+                <a:ea typeface="+mn-ea"/>
+                <a:cs typeface="+mn-cs"/>
+              </a:rPr>
+              <a:pPr marL="0" marR="0" lvl="0" indent="0" algn="r" defTabSz="914400" rtl="0" eaLnBrk="1" fontAlgn="auto" latinLnBrk="0" hangingPunct="1">
+                <a:lnSpc>
+                  <a:spcPct val="100000"/>
+                </a:lnSpc>
+                <a:spcBef>
+                  <a:spcPts val="0"/>
+                </a:spcBef>
+                <a:spcAft>
+                  <a:spcPts val="0"/>
+                </a:spcAft>
+                <a:buClrTx/>
+                <a:buSzTx/>
+                <a:buFontTx/>
+                <a:buNone/>
+                <a:tabLst/>
+                <a:defRPr/>
+              </a:pPr>
+              <a:t>‹Nr.›</a:t>
+            </a:fld>
+            <a:r>
+              <a:rPr kumimoji="0" lang="de-DE" sz="800" b="0" i="0" u="none" strike="noStrike" kern="1200" cap="none" spc="0" normalizeH="0" baseline="0" noProof="0" dirty="0" smtClean="0">
+                <a:ln>
+                  <a:noFill/>
+                </a:ln>
+                <a:solidFill>
+                  <a:schemeClr val="bg1">
+                    <a:lumMod val="50000"/>
+                  </a:schemeClr>
+                </a:solidFill>
+                <a:effectLst/>
+                <a:uLnTx/>
+                <a:uFillTx/>
+                <a:latin typeface="+mn-lt"/>
+                <a:ea typeface="+mn-ea"/>
+                <a:cs typeface="+mn-cs"/>
+              </a:rPr>
+              <a:t> / 10</a:t>
+            </a:r>
+          </a:p>
+          <a:p>
+            <a:pPr algn="r"/>
+            <a:endParaRPr lang="de-DE" sz="800" dirty="0">
+              <a:solidFill>
+                <a:schemeClr val="bg1">
+                  <a:lumMod val="65000"/>
+                </a:schemeClr>
+              </a:solidFill>
+            </a:endParaRPr>
+          </a:p>
+        </p:txBody>
+      </p:sp>
+      <p:sp>
+        <p:nvSpPr>
           <p:cNvPr id="3" name="Textplatzhalter 2"/>
           <p:cNvSpPr>
             <a:spLocks noGrp="1"/>
@@ -2103,125 +2185,6 @@
               <a:t>Fünfte Ebene</a:t>
             </a:r>
             <a:endParaRPr lang="de-DE" dirty="0"/>
-          </a:p>
-        </p:txBody>
-      </p:sp>
-      <p:sp>
-        <p:nvSpPr>
-          <p:cNvPr id="4" name="Datumsplatzhalter 3"/>
-          <p:cNvSpPr>
-            <a:spLocks noGrp="1"/>
-          </p:cNvSpPr>
-          <p:nvPr>
-            <p:ph type="dt" sz="half" idx="2"/>
-          </p:nvPr>
-        </p:nvSpPr>
-        <p:spPr>
-          <a:xfrm>
-            <a:off x="457200" y="4767263"/>
-            <a:ext cx="2133600" cy="274637"/>
-          </a:xfrm>
-          <a:prstGeom prst="rect">
-            <a:avLst/>
-          </a:prstGeom>
-        </p:spPr>
-        <p:txBody>
-          <a:bodyPr vert="horz" lIns="91440" tIns="45720" rIns="91440" bIns="45720" rtlCol="0" anchor="ctr"/>
-          <a:lstStyle>
-            <a:lvl1pPr algn="l">
-              <a:defRPr sz="1200">
-                <a:solidFill>
-                  <a:schemeClr val="tx1">
-                    <a:tint val="75000"/>
-                  </a:schemeClr>
-                </a:solidFill>
-              </a:defRPr>
-            </a:lvl1pPr>
-          </a:lstStyle>
-          <a:p>
-            <a:fld id="{DA13E788-B7EB-4A93-AB36-87ACFB4049A5}" type="datetimeFigureOut">
-              <a:rPr lang="de-DE" smtClean="0"/>
-              <a:t>09.10.2015</a:t>
-            </a:fld>
-            <a:endParaRPr lang="de-DE"/>
-          </a:p>
-        </p:txBody>
-      </p:sp>
-      <p:sp>
-        <p:nvSpPr>
-          <p:cNvPr id="5" name="Fußzeilenplatzhalter 4"/>
-          <p:cNvSpPr>
-            <a:spLocks noGrp="1"/>
-          </p:cNvSpPr>
-          <p:nvPr>
-            <p:ph type="ftr" sz="quarter" idx="3"/>
-          </p:nvPr>
-        </p:nvSpPr>
-        <p:spPr>
-          <a:xfrm>
-            <a:off x="3124200" y="4767263"/>
-            <a:ext cx="2895600" cy="274637"/>
-          </a:xfrm>
-          <a:prstGeom prst="rect">
-            <a:avLst/>
-          </a:prstGeom>
-        </p:spPr>
-        <p:txBody>
-          <a:bodyPr vert="horz" lIns="91440" tIns="45720" rIns="91440" bIns="45720" rtlCol="0" anchor="ctr"/>
-          <a:lstStyle>
-            <a:lvl1pPr algn="ctr">
-              <a:defRPr sz="1200">
-                <a:solidFill>
-                  <a:schemeClr val="tx1">
-                    <a:tint val="75000"/>
-                  </a:schemeClr>
-                </a:solidFill>
-              </a:defRPr>
-            </a:lvl1pPr>
-          </a:lstStyle>
-          <a:p>
-            <a:endParaRPr lang="de-DE"/>
-          </a:p>
-        </p:txBody>
-      </p:sp>
-      <p:sp>
-        <p:nvSpPr>
-          <p:cNvPr id="6" name="Foliennummernplatzhalter 5"/>
-          <p:cNvSpPr>
-            <a:spLocks noGrp="1"/>
-          </p:cNvSpPr>
-          <p:nvPr>
-            <p:ph type="sldNum" sz="quarter" idx="4"/>
-          </p:nvPr>
-        </p:nvSpPr>
-        <p:spPr>
-          <a:xfrm>
-            <a:off x="6553200" y="4767263"/>
-            <a:ext cx="2133600" cy="274637"/>
-          </a:xfrm>
-          <a:prstGeom prst="rect">
-            <a:avLst/>
-          </a:prstGeom>
-        </p:spPr>
-        <p:txBody>
-          <a:bodyPr vert="horz" lIns="91440" tIns="45720" rIns="91440" bIns="45720" rtlCol="0" anchor="ctr"/>
-          <a:lstStyle>
-            <a:lvl1pPr algn="r">
-              <a:defRPr sz="1200">
-                <a:solidFill>
-                  <a:schemeClr val="tx1">
-                    <a:tint val="75000"/>
-                  </a:schemeClr>
-                </a:solidFill>
-              </a:defRPr>
-            </a:lvl1pPr>
-          </a:lstStyle>
-          <a:p>
-            <a:fld id="{389DAAEF-2BAA-44E9-886D-34F630EEA82F}" type="slidenum">
-              <a:rPr lang="de-DE" smtClean="0"/>
-              <a:t>‹Nr.›</a:t>
-            </a:fld>
-            <a:endParaRPr lang="de-DE"/>
           </a:p>
         </p:txBody>
       </p:sp>
@@ -2333,7 +2296,7 @@
         </p:nvSpPr>
         <p:spPr>
           <a:xfrm>
-            <a:off x="8575104" y="948233"/>
+            <a:off x="8603024" y="943261"/>
             <a:ext cx="533400" cy="183357"/>
           </a:xfrm>
           <a:prstGeom prst="rect">
@@ -2342,7 +2305,7 @@
         </p:spPr>
         <p:txBody>
           <a:bodyPr vert="horz" anchor="ctr" anchorCtr="0">
-            <a:normAutofit fontScale="47500" lnSpcReduction="20000"/>
+            <a:noAutofit/>
           </a:bodyPr>
           <a:lstStyle>
             <a:lvl1pPr algn="ctr" eaLnBrk="1" latinLnBrk="0" hangingPunct="1">
@@ -2373,7 +2336,7 @@
               <a:defRPr/>
             </a:pPr>
             <a:fld id="{8F82E0A0-C266-4798-8C8F-B9F91E9DA37E}" type="slidenum">
-              <a:rPr kumimoji="0" lang="de-DE" sz="1400" b="1" i="0" u="none" strike="noStrike" kern="1200" cap="none" spc="0" normalizeH="0" baseline="0" noProof="0" smtClean="0">
+              <a:rPr kumimoji="0" lang="de-DE" sz="900" b="1" i="0" u="none" strike="noStrike" kern="1200" cap="none" spc="0" normalizeH="0" baseline="0" noProof="0" smtClean="0">
                 <a:ln>
                   <a:noFill/>
                 </a:ln>
@@ -2406,7 +2369,24 @@
               </a:pPr>
               <a:t>‹Nr.›</a:t>
             </a:fld>
-            <a:endParaRPr kumimoji="0" lang="de-DE" sz="1400" b="1" i="0" u="none" strike="noStrike" kern="1200" cap="none" spc="0" normalizeH="0" baseline="0" noProof="0" dirty="0">
+            <a:r>
+              <a:rPr kumimoji="0" lang="de-DE" sz="900" b="1" i="0" u="none" strike="noStrike" kern="1200" cap="none" spc="0" normalizeH="0" baseline="0" noProof="0" dirty="0" smtClean="0">
+                <a:ln>
+                  <a:noFill/>
+                </a:ln>
+                <a:solidFill>
+                  <a:srgbClr val="FFFFFF"/>
+                </a:solidFill>
+                <a:effectLst/>
+                <a:uLnTx/>
+                <a:uFillTx/>
+                <a:latin typeface="+mn-lt"/>
+                <a:ea typeface="+mn-ea"/>
+                <a:cs typeface="+mn-cs"/>
+              </a:rPr>
+              <a:t> / 10</a:t>
+            </a:r>
+            <a:endParaRPr kumimoji="0" lang="de-DE" sz="900" b="1" i="0" u="none" strike="noStrike" kern="1200" cap="none" spc="0" normalizeH="0" baseline="0" noProof="0" dirty="0">
               <a:ln>
                 <a:noFill/>
               </a:ln>
@@ -2480,7 +2460,7 @@
                 <a:ea typeface="+mj-ea"/>
                 <a:cs typeface="+mj-cs"/>
               </a:rPr>
-              <a:t>Dashboard &amp; Charts        </a:t>
+              <a:t>Dashboard &amp; Charts       </a:t>
             </a:r>
             <a:r>
               <a:rPr kumimoji="0" lang="de-DE" sz="2000" b="0" i="0" u="none" strike="noStrike" kern="1200" cap="none" spc="0" normalizeH="0" baseline="0" noProof="0" dirty="0" smtClean="0">
@@ -2826,7 +2806,7 @@
         </p:blipFill>
         <p:spPr bwMode="auto">
           <a:xfrm>
-            <a:off x="513548" y="1347614"/>
+            <a:off x="562786" y="1347614"/>
             <a:ext cx="5498612" cy="3555987"/>
           </a:xfrm>
           <a:prstGeom prst="rect">
@@ -3040,6 +3020,669 @@
     </p:tnLst>
     <p:bldLst>
       <p:bldP spid="3" grpId="1" animBg="1"/>
+    </p:bldLst>
+  </p:timing>
+</p:sld>
+</file>
+
+<file path=ppt/slides/slide10.xml><?xml version="1.0" encoding="utf-8"?>
+<p:sld xmlns:a="http://schemas.openxmlformats.org/drawingml/2006/main" xmlns:r="http://schemas.openxmlformats.org/officeDocument/2006/relationships" xmlns:p="http://schemas.openxmlformats.org/presentationml/2006/main">
+  <p:cSld>
+    <p:spTree>
+      <p:nvGrpSpPr>
+        <p:cNvPr id="1" name=""/>
+        <p:cNvGrpSpPr/>
+        <p:nvPr/>
+      </p:nvGrpSpPr>
+      <p:grpSpPr>
+        <a:xfrm>
+          <a:off x="0" y="0"/>
+          <a:ext cx="0" cy="0"/>
+          <a:chOff x="0" y="0"/>
+          <a:chExt cx="0" cy="0"/>
+        </a:xfrm>
+      </p:grpSpPr>
+      <p:sp>
+        <p:nvSpPr>
+          <p:cNvPr id="7" name="Textfeld 6"/>
+          <p:cNvSpPr txBox="1"/>
+          <p:nvPr/>
+        </p:nvSpPr>
+        <p:spPr>
+          <a:xfrm rot="21128201">
+            <a:off x="519407" y="1614336"/>
+            <a:ext cx="2880320" cy="492443"/>
+          </a:xfrm>
+          <a:prstGeom prst="rect">
+            <a:avLst/>
+          </a:prstGeom>
+          <a:solidFill>
+            <a:srgbClr val="FFA30D">
+              <a:alpha val="66000"/>
+            </a:srgbClr>
+          </a:solidFill>
+        </p:spPr>
+        <p:txBody>
+          <a:bodyPr wrap="square" rtlCol="0">
+            <a:spAutoFit/>
+          </a:bodyPr>
+          <a:lstStyle/>
+          <a:p>
+            <a:pPr algn="ctr"/>
+            <a:r>
+              <a:rPr lang="de-DE" sz="2600" b="1" dirty="0" err="1" smtClean="0">
+                <a:solidFill>
+                  <a:schemeClr val="bg1"/>
+                </a:solidFill>
+              </a:rPr>
+              <a:t>Thanks</a:t>
+            </a:r>
+            <a:r>
+              <a:rPr lang="de-DE" sz="2600" b="1" dirty="0" smtClean="0">
+                <a:solidFill>
+                  <a:schemeClr val="bg1"/>
+                </a:solidFill>
+              </a:rPr>
+              <a:t> </a:t>
+            </a:r>
+            <a:r>
+              <a:rPr lang="de-DE" sz="2600" b="1" dirty="0" err="1" smtClean="0">
+                <a:solidFill>
+                  <a:schemeClr val="bg1"/>
+                </a:solidFill>
+              </a:rPr>
+              <a:t>for</a:t>
+            </a:r>
+            <a:r>
+              <a:rPr lang="de-DE" sz="2600" b="1" dirty="0" smtClean="0">
+                <a:solidFill>
+                  <a:schemeClr val="bg1"/>
+                </a:solidFill>
+              </a:rPr>
+              <a:t> all </a:t>
+            </a:r>
+            <a:r>
+              <a:rPr lang="de-DE" sz="2600" b="1" dirty="0" smtClean="0">
+                <a:solidFill>
+                  <a:schemeClr val="bg1"/>
+                </a:solidFill>
+                <a:sym typeface="Wingdings" panose="05000000000000000000" pitchFamily="2" charset="2"/>
+              </a:rPr>
+              <a:t></a:t>
+            </a:r>
+            <a:endParaRPr lang="de-DE" sz="2600" b="1" dirty="0">
+              <a:solidFill>
+                <a:schemeClr val="bg1"/>
+              </a:solidFill>
+            </a:endParaRPr>
+          </a:p>
+        </p:txBody>
+      </p:sp>
+      <p:pic>
+        <p:nvPicPr>
+          <p:cNvPr id="1026" name="Picture 2" descr="http://ps3ego.de/wp-content/uploads/2013/06/PES-2014.jpg"/>
+          <p:cNvPicPr>
+            <a:picLocks noChangeAspect="1" noChangeArrowheads="1"/>
+          </p:cNvPicPr>
+          <p:nvPr/>
+        </p:nvPicPr>
+        <p:blipFill>
+          <a:blip r:embed="rId3" cstate="print">
+            <a:extLst>
+              <a:ext uri="{28A0092B-C50C-407E-A947-70E740481C1C}">
+                <a14:useLocalDpi xmlns:a14="http://schemas.microsoft.com/office/drawing/2010/main" xmlns="" val="0"/>
+              </a:ext>
+            </a:extLst>
+          </a:blip>
+          <a:srcRect/>
+          <a:stretch>
+            <a:fillRect/>
+          </a:stretch>
+        </p:blipFill>
+        <p:spPr bwMode="auto">
+          <a:xfrm>
+            <a:off x="3763930" y="2056081"/>
+            <a:ext cx="5083240" cy="2859322"/>
+          </a:xfrm>
+          <a:prstGeom prst="rect">
+            <a:avLst/>
+          </a:prstGeom>
+          <a:noFill/>
+          <a:extLst>
+            <a:ext uri="{909E8E84-426E-40DD-AFC4-6F175D3DCCD1}">
+              <a14:hiddenFill xmlns:a14="http://schemas.microsoft.com/office/drawing/2010/main" xmlns="">
+                <a:solidFill>
+                  <a:srgbClr val="FFFFFF"/>
+                </a:solidFill>
+              </a14:hiddenFill>
+            </a:ext>
+          </a:extLst>
+        </p:spPr>
+      </p:pic>
+      <p:sp>
+        <p:nvSpPr>
+          <p:cNvPr id="4" name="Textfeld 3"/>
+          <p:cNvSpPr txBox="1"/>
+          <p:nvPr/>
+        </p:nvSpPr>
+        <p:spPr>
+          <a:xfrm rot="21119723">
+            <a:off x="434419" y="3411175"/>
+            <a:ext cx="6933934" cy="698071"/>
+          </a:xfrm>
+          <a:prstGeom prst="rect">
+            <a:avLst/>
+          </a:prstGeom>
+          <a:solidFill>
+            <a:schemeClr val="bg1"/>
+          </a:solidFill>
+          <a:ln w="57150">
+            <a:solidFill>
+              <a:srgbClr val="FFA30D"/>
+            </a:solidFill>
+          </a:ln>
+          <a:effectLst>
+            <a:outerShdw blurRad="177800" dist="12700" dir="2700000" sx="104000" sy="104000" algn="tl" rotWithShape="0">
+              <a:prstClr val="black">
+                <a:alpha val="40000"/>
+              </a:prstClr>
+            </a:outerShdw>
+          </a:effectLst>
+        </p:spPr>
+        <p:txBody>
+          <a:bodyPr wrap="square" lIns="72000" tIns="36000" rtlCol="0" anchor="t">
+            <a:spAutoFit/>
+          </a:bodyPr>
+          <a:lstStyle/>
+          <a:p>
+            <a:pPr marL="216000">
+              <a:spcBef>
+                <a:spcPts val="1200"/>
+              </a:spcBef>
+              <a:spcAft>
+                <a:spcPts val="1200"/>
+              </a:spcAft>
+              <a:buSzPct val="180000"/>
+              <a:buBlip>
+                <a:blip r:embed="rId4"/>
+              </a:buBlip>
+            </a:pPr>
+            <a:r>
+              <a:rPr lang="de-DE" sz="4000" b="1" dirty="0" smtClean="0">
+                <a:solidFill>
+                  <a:srgbClr val="FFA30D"/>
+                </a:solidFill>
+              </a:rPr>
+              <a:t>  Nu aber !!!  Das </a:t>
+            </a:r>
+            <a:r>
+              <a:rPr lang="de-DE" sz="4000" b="1" dirty="0" err="1" smtClean="0">
+                <a:solidFill>
+                  <a:srgbClr val="FFA30D"/>
+                </a:solidFill>
+              </a:rPr>
+              <a:t>wars</a:t>
+            </a:r>
+            <a:r>
+              <a:rPr lang="de-DE" sz="4000" b="1" dirty="0" smtClean="0">
+                <a:solidFill>
+                  <a:srgbClr val="FFA30D"/>
+                </a:solidFill>
+              </a:rPr>
+              <a:t> !!! </a:t>
+            </a:r>
+            <a:r>
+              <a:rPr lang="de-DE" sz="4000" b="1" dirty="0" smtClean="0">
+                <a:solidFill>
+                  <a:srgbClr val="FFA30D"/>
+                </a:solidFill>
+                <a:sym typeface="Wingdings" panose="05000000000000000000" pitchFamily="2" charset="2"/>
+              </a:rPr>
+              <a:t></a:t>
+            </a:r>
+            <a:endParaRPr lang="de-DE" sz="4000" b="1" dirty="0">
+              <a:solidFill>
+                <a:srgbClr val="FFB848"/>
+              </a:solidFill>
+            </a:endParaRPr>
+          </a:p>
+        </p:txBody>
+      </p:sp>
+      <p:pic>
+        <p:nvPicPr>
+          <p:cNvPr id="6" name="Grafik 5"/>
+          <p:cNvPicPr>
+            <a:picLocks noChangeAspect="1"/>
+          </p:cNvPicPr>
+          <p:nvPr/>
+        </p:nvPicPr>
+        <p:blipFill>
+          <a:blip r:embed="rId5" cstate="print">
+            <a:extLst>
+              <a:ext uri="{28A0092B-C50C-407E-A947-70E740481C1C}">
+                <a14:useLocalDpi xmlns:a14="http://schemas.microsoft.com/office/drawing/2010/main" xmlns="" val="0"/>
+              </a:ext>
+            </a:extLst>
+          </a:blip>
+          <a:stretch>
+            <a:fillRect/>
+          </a:stretch>
+        </p:blipFill>
+        <p:spPr>
+          <a:xfrm>
+            <a:off x="3851920" y="0"/>
+            <a:ext cx="1584176" cy="1584176"/>
+          </a:xfrm>
+          <a:prstGeom prst="rect">
+            <a:avLst/>
+          </a:prstGeom>
+          <a:effectLst>
+            <a:outerShdw blurRad="165100" dist="88900" dir="2700000" algn="tl" rotWithShape="0">
+              <a:prstClr val="black">
+                <a:alpha val="40000"/>
+              </a:prstClr>
+            </a:outerShdw>
+          </a:effectLst>
+        </p:spPr>
+      </p:pic>
+    </p:spTree>
+    <p:extLst>
+      <p:ext uri="{BB962C8B-B14F-4D97-AF65-F5344CB8AC3E}">
+        <p14:creationId xmlns:p14="http://schemas.microsoft.com/office/powerpoint/2010/main" xmlns="" val="2150032804"/>
+      </p:ext>
+    </p:extLst>
+  </p:cSld>
+  <p:clrMapOvr>
+    <a:masterClrMapping/>
+  </p:clrMapOvr>
+  <p:timing>
+    <p:tnLst>
+      <p:par>
+        <p:cTn id="1" dur="indefinite" restart="never" nodeType="tmRoot">
+          <p:childTnLst>
+            <p:seq concurrent="1" nextAc="seek">
+              <p:cTn id="2" dur="indefinite" nodeType="mainSeq">
+                <p:childTnLst>
+                  <p:par>
+                    <p:cTn id="3" fill="hold">
+                      <p:stCondLst>
+                        <p:cond delay="indefinite"/>
+                        <p:cond evt="onBegin" delay="0">
+                          <p:tn val="2"/>
+                        </p:cond>
+                      </p:stCondLst>
+                      <p:childTnLst>
+                        <p:par>
+                          <p:cTn id="4" fill="hold">
+                            <p:stCondLst>
+                              <p:cond delay="0"/>
+                            </p:stCondLst>
+                            <p:childTnLst>
+                              <p:par>
+                                <p:cTn id="5" presetID="2" presetClass="entr" presetSubtype="8" fill="hold" grpId="0" nodeType="afterEffect">
+                                  <p:stCondLst>
+                                    <p:cond delay="0"/>
+                                  </p:stCondLst>
+                                  <p:childTnLst>
+                                    <p:set>
+                                      <p:cBhvr>
+                                        <p:cTn id="6" dur="1" fill="hold">
+                                          <p:stCondLst>
+                                            <p:cond delay="0"/>
+                                          </p:stCondLst>
+                                        </p:cTn>
+                                        <p:tgtEl>
+                                          <p:spTgt spid="7"/>
+                                        </p:tgtEl>
+                                        <p:attrNameLst>
+                                          <p:attrName>style.visibility</p:attrName>
+                                        </p:attrNameLst>
+                                      </p:cBhvr>
+                                      <p:to>
+                                        <p:strVal val="visible"/>
+                                      </p:to>
+                                    </p:set>
+                                    <p:anim calcmode="lin" valueType="num">
+                                      <p:cBhvr additive="base">
+                                        <p:cTn id="7" dur="200" fill="hold"/>
+                                        <p:tgtEl>
+                                          <p:spTgt spid="7"/>
+                                        </p:tgtEl>
+                                        <p:attrNameLst>
+                                          <p:attrName>ppt_x</p:attrName>
+                                        </p:attrNameLst>
+                                      </p:cBhvr>
+                                      <p:tavLst>
+                                        <p:tav tm="0">
+                                          <p:val>
+                                            <p:strVal val="0-#ppt_w/2"/>
+                                          </p:val>
+                                        </p:tav>
+                                        <p:tav tm="100000">
+                                          <p:val>
+                                            <p:strVal val="#ppt_x"/>
+                                          </p:val>
+                                        </p:tav>
+                                      </p:tavLst>
+                                    </p:anim>
+                                    <p:anim calcmode="lin" valueType="num">
+                                      <p:cBhvr additive="base">
+                                        <p:cTn id="8" dur="200" fill="hold"/>
+                                        <p:tgtEl>
+                                          <p:spTgt spid="7"/>
+                                        </p:tgtEl>
+                                        <p:attrNameLst>
+                                          <p:attrName>ppt_y</p:attrName>
+                                        </p:attrNameLst>
+                                      </p:cBhvr>
+                                      <p:tavLst>
+                                        <p:tav tm="0">
+                                          <p:val>
+                                            <p:strVal val="#ppt_y"/>
+                                          </p:val>
+                                        </p:tav>
+                                        <p:tav tm="100000">
+                                          <p:val>
+                                            <p:strVal val="#ppt_y"/>
+                                          </p:val>
+                                        </p:tav>
+                                      </p:tavLst>
+                                    </p:anim>
+                                  </p:childTnLst>
+                                </p:cTn>
+                              </p:par>
+                            </p:childTnLst>
+                          </p:cTn>
+                        </p:par>
+                        <p:par>
+                          <p:cTn id="9" fill="hold">
+                            <p:stCondLst>
+                              <p:cond delay="200"/>
+                            </p:stCondLst>
+                            <p:childTnLst>
+                              <p:par>
+                                <p:cTn id="10" presetID="2" presetClass="exit" presetSubtype="6" fill="hold" nodeType="afterEffect">
+                                  <p:stCondLst>
+                                    <p:cond delay="1000"/>
+                                  </p:stCondLst>
+                                  <p:childTnLst>
+                                    <p:anim calcmode="lin" valueType="num">
+                                      <p:cBhvr additive="base">
+                                        <p:cTn id="11" dur="500"/>
+                                        <p:tgtEl>
+                                          <p:spTgt spid="6"/>
+                                        </p:tgtEl>
+                                        <p:attrNameLst>
+                                          <p:attrName>ppt_x</p:attrName>
+                                        </p:attrNameLst>
+                                      </p:cBhvr>
+                                      <p:tavLst>
+                                        <p:tav tm="0">
+                                          <p:val>
+                                            <p:strVal val="ppt_x"/>
+                                          </p:val>
+                                        </p:tav>
+                                        <p:tav tm="100000">
+                                          <p:val>
+                                            <p:strVal val="1+ppt_w/2"/>
+                                          </p:val>
+                                        </p:tav>
+                                      </p:tavLst>
+                                    </p:anim>
+                                    <p:anim calcmode="lin" valueType="num">
+                                      <p:cBhvr additive="base">
+                                        <p:cTn id="12" dur="500"/>
+                                        <p:tgtEl>
+                                          <p:spTgt spid="6"/>
+                                        </p:tgtEl>
+                                        <p:attrNameLst>
+                                          <p:attrName>ppt_y</p:attrName>
+                                        </p:attrNameLst>
+                                      </p:cBhvr>
+                                      <p:tavLst>
+                                        <p:tav tm="0">
+                                          <p:val>
+                                            <p:strVal val="ppt_y"/>
+                                          </p:val>
+                                        </p:tav>
+                                        <p:tav tm="100000">
+                                          <p:val>
+                                            <p:strVal val="1+ppt_h/2"/>
+                                          </p:val>
+                                        </p:tav>
+                                      </p:tavLst>
+                                    </p:anim>
+                                    <p:set>
+                                      <p:cBhvr>
+                                        <p:cTn id="13" dur="1" fill="hold">
+                                          <p:stCondLst>
+                                            <p:cond delay="499"/>
+                                          </p:stCondLst>
+                                        </p:cTn>
+                                        <p:tgtEl>
+                                          <p:spTgt spid="6"/>
+                                        </p:tgtEl>
+                                        <p:attrNameLst>
+                                          <p:attrName>style.visibility</p:attrName>
+                                        </p:attrNameLst>
+                                      </p:cBhvr>
+                                      <p:to>
+                                        <p:strVal val="hidden"/>
+                                      </p:to>
+                                    </p:set>
+                                  </p:childTnLst>
+                                </p:cTn>
+                              </p:par>
+                            </p:childTnLst>
+                          </p:cTn>
+                        </p:par>
+                        <p:par>
+                          <p:cTn id="14" fill="hold">
+                            <p:stCondLst>
+                              <p:cond delay="1700"/>
+                            </p:stCondLst>
+                            <p:childTnLst>
+                              <p:par>
+                                <p:cTn id="15" presetID="53" presetClass="entr" presetSubtype="16" fill="hold" nodeType="afterEffect">
+                                  <p:stCondLst>
+                                    <p:cond delay="250"/>
+                                  </p:stCondLst>
+                                  <p:childTnLst>
+                                    <p:set>
+                                      <p:cBhvr>
+                                        <p:cTn id="16" dur="1" fill="hold">
+                                          <p:stCondLst>
+                                            <p:cond delay="0"/>
+                                          </p:stCondLst>
+                                        </p:cTn>
+                                        <p:tgtEl>
+                                          <p:spTgt spid="1026"/>
+                                        </p:tgtEl>
+                                        <p:attrNameLst>
+                                          <p:attrName>style.visibility</p:attrName>
+                                        </p:attrNameLst>
+                                      </p:cBhvr>
+                                      <p:to>
+                                        <p:strVal val="visible"/>
+                                      </p:to>
+                                    </p:set>
+                                    <p:anim calcmode="lin" valueType="num">
+                                      <p:cBhvr>
+                                        <p:cTn id="17" dur="200" fill="hold"/>
+                                        <p:tgtEl>
+                                          <p:spTgt spid="1026"/>
+                                        </p:tgtEl>
+                                        <p:attrNameLst>
+                                          <p:attrName>ppt_w</p:attrName>
+                                        </p:attrNameLst>
+                                      </p:cBhvr>
+                                      <p:tavLst>
+                                        <p:tav tm="0">
+                                          <p:val>
+                                            <p:fltVal val="0"/>
+                                          </p:val>
+                                        </p:tav>
+                                        <p:tav tm="100000">
+                                          <p:val>
+                                            <p:strVal val="#ppt_w"/>
+                                          </p:val>
+                                        </p:tav>
+                                      </p:tavLst>
+                                    </p:anim>
+                                    <p:anim calcmode="lin" valueType="num">
+                                      <p:cBhvr>
+                                        <p:cTn id="18" dur="200" fill="hold"/>
+                                        <p:tgtEl>
+                                          <p:spTgt spid="1026"/>
+                                        </p:tgtEl>
+                                        <p:attrNameLst>
+                                          <p:attrName>ppt_h</p:attrName>
+                                        </p:attrNameLst>
+                                      </p:cBhvr>
+                                      <p:tavLst>
+                                        <p:tav tm="0">
+                                          <p:val>
+                                            <p:fltVal val="0"/>
+                                          </p:val>
+                                        </p:tav>
+                                        <p:tav tm="100000">
+                                          <p:val>
+                                            <p:strVal val="#ppt_h"/>
+                                          </p:val>
+                                        </p:tav>
+                                      </p:tavLst>
+                                    </p:anim>
+                                    <p:animEffect transition="in" filter="fade">
+                                      <p:cBhvr>
+                                        <p:cTn id="19" dur="200"/>
+                                        <p:tgtEl>
+                                          <p:spTgt spid="1026"/>
+                                        </p:tgtEl>
+                                      </p:cBhvr>
+                                    </p:animEffect>
+                                  </p:childTnLst>
+                                </p:cTn>
+                              </p:par>
+                            </p:childTnLst>
+                          </p:cTn>
+                        </p:par>
+                        <p:par>
+                          <p:cTn id="20" fill="hold">
+                            <p:stCondLst>
+                              <p:cond delay="2150"/>
+                            </p:stCondLst>
+                            <p:childTnLst>
+                              <p:par>
+                                <p:cTn id="21" presetID="53" presetClass="entr" presetSubtype="16" fill="hold" grpId="0" nodeType="afterEffect">
+                                  <p:stCondLst>
+                                    <p:cond delay="250"/>
+                                  </p:stCondLst>
+                                  <p:childTnLst>
+                                    <p:set>
+                                      <p:cBhvr>
+                                        <p:cTn id="22" dur="1" fill="hold">
+                                          <p:stCondLst>
+                                            <p:cond delay="0"/>
+                                          </p:stCondLst>
+                                        </p:cTn>
+                                        <p:tgtEl>
+                                          <p:spTgt spid="4"/>
+                                        </p:tgtEl>
+                                        <p:attrNameLst>
+                                          <p:attrName>style.visibility</p:attrName>
+                                        </p:attrNameLst>
+                                      </p:cBhvr>
+                                      <p:to>
+                                        <p:strVal val="visible"/>
+                                      </p:to>
+                                    </p:set>
+                                    <p:anim calcmode="lin" valueType="num">
+                                      <p:cBhvr>
+                                        <p:cTn id="23" dur="200" fill="hold"/>
+                                        <p:tgtEl>
+                                          <p:spTgt spid="4"/>
+                                        </p:tgtEl>
+                                        <p:attrNameLst>
+                                          <p:attrName>ppt_w</p:attrName>
+                                        </p:attrNameLst>
+                                      </p:cBhvr>
+                                      <p:tavLst>
+                                        <p:tav tm="0">
+                                          <p:val>
+                                            <p:fltVal val="0"/>
+                                          </p:val>
+                                        </p:tav>
+                                        <p:tav tm="100000">
+                                          <p:val>
+                                            <p:strVal val="#ppt_w"/>
+                                          </p:val>
+                                        </p:tav>
+                                      </p:tavLst>
+                                    </p:anim>
+                                    <p:anim calcmode="lin" valueType="num">
+                                      <p:cBhvr>
+                                        <p:cTn id="24" dur="200" fill="hold"/>
+                                        <p:tgtEl>
+                                          <p:spTgt spid="4"/>
+                                        </p:tgtEl>
+                                        <p:attrNameLst>
+                                          <p:attrName>ppt_h</p:attrName>
+                                        </p:attrNameLst>
+                                      </p:cBhvr>
+                                      <p:tavLst>
+                                        <p:tav tm="0">
+                                          <p:val>
+                                            <p:fltVal val="0"/>
+                                          </p:val>
+                                        </p:tav>
+                                        <p:tav tm="100000">
+                                          <p:val>
+                                            <p:strVal val="#ppt_h"/>
+                                          </p:val>
+                                        </p:tav>
+                                      </p:tavLst>
+                                    </p:anim>
+                                    <p:animEffect transition="in" filter="fade">
+                                      <p:cBhvr>
+                                        <p:cTn id="25" dur="200"/>
+                                        <p:tgtEl>
+                                          <p:spTgt spid="4"/>
+                                        </p:tgtEl>
+                                      </p:cBhvr>
+                                    </p:animEffect>
+                                  </p:childTnLst>
+                                </p:cTn>
+                              </p:par>
+                            </p:childTnLst>
+                          </p:cTn>
+                        </p:par>
+                      </p:childTnLst>
+                    </p:cTn>
+                  </p:par>
+                </p:childTnLst>
+              </p:cTn>
+              <p:prevCondLst>
+                <p:cond evt="onPrev" delay="0">
+                  <p:tgtEl>
+                    <p:sldTgt/>
+                  </p:tgtEl>
+                </p:cond>
+              </p:prevCondLst>
+              <p:nextCondLst>
+                <p:cond evt="onNext" delay="0">
+                  <p:tgtEl>
+                    <p:sldTgt/>
+                  </p:tgtEl>
+                </p:cond>
+              </p:nextCondLst>
+            </p:seq>
+          </p:childTnLst>
+        </p:cTn>
+      </p:par>
+    </p:tnLst>
+    <p:bldLst>
+      <p:bldP spid="7" grpId="0" animBg="1"/>
+      <p:bldP spid="4" grpId="0" animBg="1"/>
     </p:bldLst>
   </p:timing>
 </p:sld>
@@ -6831,7 +7474,7 @@
           <a:blip r:embed="rId3" cstate="print">
             <a:extLst>
               <a:ext uri="{28A0092B-C50C-407E-A947-70E740481C1C}">
-                <a14:useLocalDpi xmlns:a14="http://schemas.microsoft.com/office/drawing/2010/main" val="0"/>
+                <a14:useLocalDpi xmlns:a14="http://schemas.microsoft.com/office/drawing/2010/main" xmlns="" val="0"/>
               </a:ext>
             </a:extLst>
           </a:blip>
@@ -6851,7 +7494,7 @@
           <a:noFill/>
           <a:extLst>
             <a:ext uri="{909E8E84-426E-40DD-AFC4-6F175D3DCCD1}">
-              <a14:hiddenFill xmlns:a14="http://schemas.microsoft.com/office/drawing/2010/main">
+              <a14:hiddenFill xmlns:a14="http://schemas.microsoft.com/office/drawing/2010/main" xmlns="">
                 <a:solidFill>
                   <a:srgbClr val="FFFFFF"/>
                 </a:solidFill>
@@ -7015,7 +7658,7 @@
           <a:blip r:embed="rId5" cstate="print">
             <a:extLst>
               <a:ext uri="{28A0092B-C50C-407E-A947-70E740481C1C}">
-                <a14:useLocalDpi xmlns:a14="http://schemas.microsoft.com/office/drawing/2010/main" val="0"/>
+                <a14:useLocalDpi xmlns:a14="http://schemas.microsoft.com/office/drawing/2010/main" xmlns="" val="0"/>
               </a:ext>
             </a:extLst>
           </a:blip>
@@ -7043,7 +7686,7 @@
     </p:spTree>
     <p:extLst>
       <p:ext uri="{BB962C8B-B14F-4D97-AF65-F5344CB8AC3E}">
-        <p14:creationId xmlns:p14="http://schemas.microsoft.com/office/powerpoint/2010/main" val="1000412283"/>
+        <p14:creationId xmlns:p14="http://schemas.microsoft.com/office/powerpoint/2010/main" xmlns="" val="1000412283"/>
       </p:ext>
     </p:extLst>
   </p:cSld>
@@ -7705,7 +8348,7 @@
           <a:blip r:embed="rId5" cstate="print">
             <a:extLst>
               <a:ext uri="{28A0092B-C50C-407E-A947-70E740481C1C}">
-                <a14:useLocalDpi xmlns:a14="http://schemas.microsoft.com/office/drawing/2010/main" val="0"/>
+                <a14:useLocalDpi xmlns:a14="http://schemas.microsoft.com/office/drawing/2010/main" xmlns="" val="0"/>
               </a:ext>
             </a:extLst>
           </a:blip>
@@ -7732,7 +8375,7 @@
           </a:effectLst>
           <a:extLst>
             <a:ext uri="{909E8E84-426E-40DD-AFC4-6F175D3DCCD1}">
-              <a14:hiddenFill xmlns:a14="http://schemas.microsoft.com/office/drawing/2010/main">
+              <a14:hiddenFill xmlns:a14="http://schemas.microsoft.com/office/drawing/2010/main" xmlns="">
                 <a:solidFill>
                   <a:srgbClr val="FFFFFF"/>
                 </a:solidFill>
@@ -7753,7 +8396,7 @@
           <a:blip r:embed="rId6" cstate="print">
             <a:extLst>
               <a:ext uri="{28A0092B-C50C-407E-A947-70E740481C1C}">
-                <a14:useLocalDpi xmlns:a14="http://schemas.microsoft.com/office/drawing/2010/main" val="0"/>
+                <a14:useLocalDpi xmlns:a14="http://schemas.microsoft.com/office/drawing/2010/main" xmlns="" val="0"/>
               </a:ext>
             </a:extLst>
           </a:blip>
@@ -7781,7 +8424,7 @@
     </p:spTree>
     <p:extLst>
       <p:ext uri="{BB962C8B-B14F-4D97-AF65-F5344CB8AC3E}">
-        <p14:creationId xmlns:p14="http://schemas.microsoft.com/office/powerpoint/2010/main" val="3405014665"/>
+        <p14:creationId xmlns:p14="http://schemas.microsoft.com/office/powerpoint/2010/main" xmlns="" val="3405014665"/>
       </p:ext>
     </p:extLst>
   </p:cSld>
@@ -8772,7 +9415,7 @@
           <a:blip r:embed="rId6" cstate="print">
             <a:extLst>
               <a:ext uri="{28A0092B-C50C-407E-A947-70E740481C1C}">
-                <a14:useLocalDpi xmlns:a14="http://schemas.microsoft.com/office/drawing/2010/main" val="0"/>
+                <a14:useLocalDpi xmlns:a14="http://schemas.microsoft.com/office/drawing/2010/main" xmlns="" val="0"/>
               </a:ext>
             </a:extLst>
           </a:blip>
@@ -8800,7 +9443,7 @@
     </p:spTree>
     <p:extLst>
       <p:ext uri="{BB962C8B-B14F-4D97-AF65-F5344CB8AC3E}">
-        <p14:creationId xmlns:p14="http://schemas.microsoft.com/office/powerpoint/2010/main" val="888192572"/>
+        <p14:creationId xmlns:p14="http://schemas.microsoft.com/office/powerpoint/2010/main" xmlns="" val="888192572"/>
       </p:ext>
     </p:extLst>
   </p:cSld>
@@ -9319,6 +9962,238 @@
           <a:chExt cx="0" cy="0"/>
         </a:xfrm>
       </p:grpSpPr>
+      <p:pic>
+        <p:nvPicPr>
+          <p:cNvPr id="5" name="Picture 3"/>
+          <p:cNvPicPr>
+            <a:picLocks noChangeAspect="1" noChangeArrowheads="1"/>
+          </p:cNvPicPr>
+          <p:nvPr/>
+        </p:nvPicPr>
+        <p:blipFill>
+          <a:blip r:embed="rId3" cstate="print"/>
+          <a:srcRect/>
+          <a:stretch>
+            <a:fillRect/>
+          </a:stretch>
+        </p:blipFill>
+        <p:spPr bwMode="auto">
+          <a:xfrm>
+            <a:off x="611561" y="2742069"/>
+            <a:ext cx="2520280" cy="1629881"/>
+          </a:xfrm>
+          <a:prstGeom prst="rect">
+            <a:avLst/>
+          </a:prstGeom>
+          <a:noFill/>
+          <a:ln w="9525">
+            <a:noFill/>
+            <a:miter lim="800000"/>
+            <a:headEnd/>
+            <a:tailEnd/>
+          </a:ln>
+        </p:spPr>
+      </p:pic>
+      <p:sp>
+        <p:nvSpPr>
+          <p:cNvPr id="6" name="Textfeld 5"/>
+          <p:cNvSpPr txBox="1"/>
+          <p:nvPr/>
+        </p:nvSpPr>
+        <p:spPr>
+          <a:xfrm>
+            <a:off x="3419872" y="1131590"/>
+            <a:ext cx="5724128" cy="3529616"/>
+          </a:xfrm>
+          <a:prstGeom prst="rect">
+            <a:avLst/>
+          </a:prstGeom>
+          <a:noFill/>
+        </p:spPr>
+        <p:txBody>
+          <a:bodyPr wrap="square" lIns="72000" tIns="36000" rtlCol="0" anchor="t">
+            <a:spAutoFit/>
+          </a:bodyPr>
+          <a:lstStyle/>
+          <a:p>
+            <a:pPr>
+              <a:lnSpc>
+                <a:spcPct val="200000"/>
+              </a:lnSpc>
+              <a:buSzPct val="180000"/>
+              <a:buBlip>
+                <a:blip r:embed="rId4"/>
+              </a:buBlip>
+            </a:pPr>
+            <a:r>
+              <a:rPr lang="de-DE" sz="2800" b="1" dirty="0" smtClean="0">
+                <a:solidFill>
+                  <a:srgbClr val="FFA30D"/>
+                </a:solidFill>
+              </a:rPr>
+              <a:t>  Lueg</a:t>
+            </a:r>
+            <a:r>
+              <a:rPr lang="de-DE" sz="2800" b="1" dirty="0" smtClean="0">
+                <a:solidFill>
+                  <a:srgbClr val="EE9300"/>
+                </a:solidFill>
+              </a:rPr>
+              <a:t>   </a:t>
+            </a:r>
+            <a:r>
+              <a:rPr lang="de-DE" sz="1200" b="1" dirty="0" smtClean="0">
+                <a:solidFill>
+                  <a:srgbClr val="EE9300"/>
+                </a:solidFill>
+              </a:rPr>
+              <a:t>am </a:t>
+            </a:r>
+            <a:r>
+              <a:rPr lang="de-DE" sz="1200" b="1" dirty="0" err="1" smtClean="0">
+                <a:solidFill>
+                  <a:srgbClr val="EE9300"/>
+                </a:solidFill>
+              </a:rPr>
+              <a:t>Kroschke</a:t>
+            </a:r>
+            <a:r>
+              <a:rPr lang="de-DE" sz="1200" b="1" dirty="0" smtClean="0">
+                <a:solidFill>
+                  <a:srgbClr val="EE9300"/>
+                </a:solidFill>
+              </a:rPr>
+              <a:t> „On“ Testportal</a:t>
+            </a:r>
+            <a:endParaRPr lang="de-DE" sz="1200" b="1" dirty="0" smtClean="0">
+              <a:solidFill>
+                <a:srgbClr val="FFA30D"/>
+              </a:solidFill>
+            </a:endParaRPr>
+          </a:p>
+          <a:p>
+            <a:pPr>
+              <a:lnSpc>
+                <a:spcPct val="200000"/>
+              </a:lnSpc>
+              <a:buSzPct val="180000"/>
+              <a:buBlip>
+                <a:blip r:embed="rId4"/>
+              </a:buBlip>
+            </a:pPr>
+            <a:r>
+              <a:rPr lang="de-DE" sz="2800" b="1" dirty="0" smtClean="0">
+                <a:solidFill>
+                  <a:srgbClr val="EE9300"/>
+                </a:solidFill>
+              </a:rPr>
+              <a:t>  </a:t>
+            </a:r>
+            <a:r>
+              <a:rPr lang="de-DE" sz="2800" b="1" dirty="0" err="1" smtClean="0">
+                <a:solidFill>
+                  <a:srgbClr val="EE9300"/>
+                </a:solidFill>
+              </a:rPr>
+              <a:t>Cargate</a:t>
+            </a:r>
+            <a:r>
+              <a:rPr lang="de-DE" sz="2800" b="1" dirty="0" smtClean="0">
+                <a:solidFill>
+                  <a:srgbClr val="EE9300"/>
+                </a:solidFill>
+              </a:rPr>
+              <a:t> (VWL)   </a:t>
+            </a:r>
+            <a:r>
+              <a:rPr lang="de-DE" sz="1200" b="1" dirty="0" smtClean="0">
+                <a:solidFill>
+                  <a:srgbClr val="EE9300"/>
+                </a:solidFill>
+              </a:rPr>
+              <a:t>am DAD Testportal</a:t>
+            </a:r>
+          </a:p>
+          <a:p>
+            <a:pPr>
+              <a:lnSpc>
+                <a:spcPct val="200000"/>
+              </a:lnSpc>
+              <a:buSzPct val="180000"/>
+              <a:buBlip>
+                <a:blip r:embed="rId4"/>
+              </a:buBlip>
+            </a:pPr>
+            <a:r>
+              <a:rPr lang="de-DE" sz="2800" b="1" dirty="0" smtClean="0">
+                <a:solidFill>
+                  <a:srgbClr val="EE9300"/>
+                </a:solidFill>
+              </a:rPr>
+              <a:t>  </a:t>
+            </a:r>
+            <a:r>
+              <a:rPr lang="de-DE" sz="2800" b="1" dirty="0" err="1" smtClean="0">
+                <a:solidFill>
+                  <a:srgbClr val="EE9300"/>
+                </a:solidFill>
+              </a:rPr>
+              <a:t>Cardocu</a:t>
+            </a:r>
+            <a:r>
+              <a:rPr lang="de-DE" sz="2800" b="1" dirty="0" smtClean="0">
+                <a:solidFill>
+                  <a:srgbClr val="EE9300"/>
+                </a:solidFill>
+              </a:rPr>
+              <a:t>  </a:t>
+            </a:r>
+            <a:r>
+              <a:rPr lang="de-DE" sz="1200" b="1" dirty="0" smtClean="0">
+                <a:solidFill>
+                  <a:srgbClr val="EE9300"/>
+                </a:solidFill>
+              </a:rPr>
+              <a:t>am DAD Testportal</a:t>
+            </a:r>
+          </a:p>
+          <a:p>
+            <a:pPr>
+              <a:lnSpc>
+                <a:spcPct val="200000"/>
+              </a:lnSpc>
+              <a:buSzPct val="180000"/>
+              <a:buBlip>
+                <a:blip r:embed="rId4"/>
+              </a:buBlip>
+            </a:pPr>
+            <a:r>
+              <a:rPr lang="de-DE" sz="2800" b="1" dirty="0">
+                <a:solidFill>
+                  <a:srgbClr val="EE9300"/>
+                </a:solidFill>
+              </a:rPr>
+              <a:t> </a:t>
+            </a:r>
+            <a:r>
+              <a:rPr lang="de-DE" sz="2800" b="1" dirty="0" smtClean="0">
+                <a:solidFill>
+                  <a:srgbClr val="EE9300"/>
+                </a:solidFill>
+              </a:rPr>
+              <a:t> Atlas Leasing   </a:t>
+            </a:r>
+            <a:r>
+              <a:rPr lang="de-DE" sz="1200" b="1" dirty="0" smtClean="0">
+                <a:solidFill>
+                  <a:srgbClr val="EE9300"/>
+                </a:solidFill>
+              </a:rPr>
+              <a:t>am DAD Testportal</a:t>
+            </a:r>
+          </a:p>
+        </p:txBody>
+      </p:sp>
       <p:sp>
         <p:nvSpPr>
           <p:cNvPr id="7" name="Textfeld 6"/>
@@ -9326,9 +10201,9 @@
           <p:nvPr/>
         </p:nvSpPr>
         <p:spPr>
-          <a:xfrm rot="21128201">
-            <a:off x="519407" y="1614336"/>
-            <a:ext cx="2880320" cy="492443"/>
+          <a:xfrm>
+            <a:off x="611560" y="1563638"/>
+            <a:ext cx="2520280" cy="892552"/>
           </a:xfrm>
           <a:prstGeom prst="rect">
             <a:avLst/>
@@ -9347,45 +10222,12 @@
           <a:p>
             <a:pPr algn="ctr"/>
             <a:r>
-              <a:rPr lang="de-DE" sz="2600" b="1" dirty="0" err="1" smtClean="0">
-                <a:solidFill>
-                  <a:schemeClr val="bg1"/>
-                </a:solidFill>
-              </a:rPr>
-              <a:t>Thanks</a:t>
-            </a:r>
-            <a:r>
               <a:rPr lang="de-DE" sz="2600" b="1" dirty="0" smtClean="0">
                 <a:solidFill>
                   <a:schemeClr val="bg1"/>
                 </a:solidFill>
               </a:rPr>
-              <a:t> </a:t>
-            </a:r>
-            <a:r>
-              <a:rPr lang="de-DE" sz="2600" b="1" dirty="0" err="1" smtClean="0">
-                <a:solidFill>
-                  <a:schemeClr val="bg1"/>
-                </a:solidFill>
-              </a:rPr>
-              <a:t>for</a:t>
-            </a:r>
-            <a:r>
-              <a:rPr lang="de-DE" sz="2600" b="1" dirty="0" smtClean="0">
-                <a:solidFill>
-                  <a:schemeClr val="bg1"/>
-                </a:solidFill>
-              </a:rPr>
-              <a:t> all </a:t>
-            </a:r>
-            <a:r>
-              <a:rPr lang="de-DE" sz="2600" b="1" dirty="0" smtClean="0">
-                <a:solidFill>
-                  <a:schemeClr val="bg1"/>
-                </a:solidFill>
-                <a:sym typeface="Wingdings" panose="05000000000000000000" pitchFamily="2" charset="2"/>
-              </a:rPr>
-              <a:t></a:t>
+              <a:t>Kunden zum Schnuppern</a:t>
             </a:r>
             <a:endParaRPr lang="de-DE" sz="2600" b="1" dirty="0">
               <a:solidFill>
@@ -9397,137 +10239,7 @@
       </p:sp>
       <p:pic>
         <p:nvPicPr>
-          <p:cNvPr id="1026" name="Picture 2" descr="http://ps3ego.de/wp-content/uploads/2013/06/PES-2014.jpg"/>
-          <p:cNvPicPr>
-            <a:picLocks noChangeAspect="1" noChangeArrowheads="1"/>
-          </p:cNvPicPr>
-          <p:nvPr/>
-        </p:nvPicPr>
-        <p:blipFill>
-          <a:blip r:embed="rId3" cstate="print">
-            <a:extLst>
-              <a:ext uri="{28A0092B-C50C-407E-A947-70E740481C1C}">
-                <a14:useLocalDpi xmlns:a14="http://schemas.microsoft.com/office/drawing/2010/main" val="0"/>
-              </a:ext>
-            </a:extLst>
-          </a:blip>
-          <a:srcRect/>
-          <a:stretch>
-            <a:fillRect/>
-          </a:stretch>
-        </p:blipFill>
-        <p:spPr bwMode="auto">
-          <a:xfrm>
-            <a:off x="3763930" y="2056081"/>
-            <a:ext cx="5083240" cy="2859322"/>
-          </a:xfrm>
-          <a:prstGeom prst="rect">
-            <a:avLst/>
-          </a:prstGeom>
-          <a:noFill/>
-          <a:extLst>
-            <a:ext uri="{909E8E84-426E-40DD-AFC4-6F175D3DCCD1}">
-              <a14:hiddenFill xmlns:a14="http://schemas.microsoft.com/office/drawing/2010/main">
-                <a:solidFill>
-                  <a:srgbClr val="FFFFFF"/>
-                </a:solidFill>
-              </a14:hiddenFill>
-            </a:ext>
-          </a:extLst>
-        </p:spPr>
-      </p:pic>
-      <p:sp>
-        <p:nvSpPr>
-          <p:cNvPr id="4" name="Textfeld 3"/>
-          <p:cNvSpPr txBox="1"/>
-          <p:nvPr/>
-        </p:nvSpPr>
-        <p:spPr>
-          <a:xfrm rot="21119723">
-            <a:off x="434419" y="3411175"/>
-            <a:ext cx="6933934" cy="698071"/>
-          </a:xfrm>
-          <a:prstGeom prst="rect">
-            <a:avLst/>
-          </a:prstGeom>
-          <a:solidFill>
-            <a:schemeClr val="bg1"/>
-          </a:solidFill>
-          <a:ln w="57150">
-            <a:solidFill>
-              <a:srgbClr val="FFA30D"/>
-            </a:solidFill>
-          </a:ln>
-          <a:effectLst>
-            <a:outerShdw blurRad="177800" dist="12700" dir="2700000" sx="104000" sy="104000" algn="tl" rotWithShape="0">
-              <a:prstClr val="black">
-                <a:alpha val="40000"/>
-              </a:prstClr>
-            </a:outerShdw>
-          </a:effectLst>
-        </p:spPr>
-        <p:txBody>
-          <a:bodyPr wrap="square" lIns="72000" tIns="36000" rtlCol="0" anchor="t">
-            <a:spAutoFit/>
-          </a:bodyPr>
-          <a:lstStyle/>
-          <a:p>
-            <a:pPr marL="216000">
-              <a:spcBef>
-                <a:spcPts val="1200"/>
-              </a:spcBef>
-              <a:spcAft>
-                <a:spcPts val="1200"/>
-              </a:spcAft>
-              <a:buSzPct val="180000"/>
-              <a:buBlip>
-                <a:blip r:embed="rId4"/>
-              </a:buBlip>
-            </a:pPr>
-            <a:r>
-              <a:rPr lang="de-DE" sz="4000" b="1" dirty="0" smtClean="0">
-                <a:solidFill>
-                  <a:srgbClr val="FFA30D"/>
-                </a:solidFill>
-              </a:rPr>
-              <a:t>  Nu aber !!!  Das </a:t>
-            </a:r>
-            <a:r>
-              <a:rPr lang="de-DE" sz="4000" b="1" dirty="0" err="1" smtClean="0">
-                <a:solidFill>
-                  <a:srgbClr val="FFA30D"/>
-                </a:solidFill>
-              </a:rPr>
-              <a:t>wars</a:t>
-            </a:r>
-            <a:r>
-              <a:rPr lang="de-DE" sz="4000" b="1" dirty="0" smtClean="0">
-                <a:solidFill>
-                  <a:srgbClr val="FFA30D"/>
-                </a:solidFill>
-              </a:rPr>
-              <a:t> !!! </a:t>
-            </a:r>
-            <a:r>
-              <a:rPr lang="de-DE" sz="4000" b="1" dirty="0" smtClean="0">
-                <a:solidFill>
-                  <a:srgbClr val="FFA30D"/>
-                </a:solidFill>
-                <a:sym typeface="Wingdings" panose="05000000000000000000" pitchFamily="2" charset="2"/>
-              </a:rPr>
-              <a:t></a:t>
-            </a:r>
-            <a:endParaRPr lang="de-DE" sz="4000" b="1" dirty="0">
-              <a:solidFill>
-                <a:srgbClr val="FFB848"/>
-              </a:solidFill>
-            </a:endParaRPr>
-          </a:p>
-        </p:txBody>
-      </p:sp>
-      <p:pic>
-        <p:nvPicPr>
-          <p:cNvPr id="6" name="Grafik 5"/>
+          <p:cNvPr id="2" name="Grafik 1"/>
           <p:cNvPicPr>
             <a:picLocks noChangeAspect="1"/>
           </p:cNvPicPr>
@@ -9537,7 +10249,7 @@
           <a:blip r:embed="rId5" cstate="print">
             <a:extLst>
               <a:ext uri="{28A0092B-C50C-407E-A947-70E740481C1C}">
-                <a14:useLocalDpi xmlns:a14="http://schemas.microsoft.com/office/drawing/2010/main" val="0"/>
+                <a14:useLocalDpi xmlns:a14="http://schemas.microsoft.com/office/drawing/2010/main" xmlns="" val="0"/>
               </a:ext>
             </a:extLst>
           </a:blip>
@@ -9565,7 +10277,7 @@
     </p:spTree>
     <p:extLst>
       <p:ext uri="{BB962C8B-B14F-4D97-AF65-F5344CB8AC3E}">
-        <p14:creationId xmlns:p14="http://schemas.microsoft.com/office/powerpoint/2010/main" val="2150032804"/>
+        <p14:creationId xmlns:p14="http://schemas.microsoft.com/office/powerpoint/2010/main" xmlns="" val="3405014665"/>
       </p:ext>
     </p:extLst>
   </p:cSld>
@@ -9621,7 +10333,7 @@
                                     </p:set>
                                     <p:anim calcmode="lin" valueType="num">
                                       <p:cBhvr additive="base">
-                                        <p:cTn id="7" dur="200" fill="hold"/>
+                                        <p:cTn id="7" dur="300" fill="hold"/>
                                         <p:tgtEl>
                                           <p:spTgt spid="7"/>
                                         </p:tgtEl>
@@ -9644,7 +10356,7 @@
                                     </p:anim>
                                     <p:anim calcmode="lin" valueType="num">
                                       <p:cBhvr additive="base">
-                                        <p:cTn id="8" dur="200" fill="hold"/>
+                                        <p:cTn id="8" dur="300" fill="hold"/>
                                         <p:tgtEl>
                                           <p:spTgt spid="7"/>
                                         </p:tgtEl>
@@ -9674,20 +10386,38 @@
                         <p:par>
                           <p:cTn id="9" fill="hold">
                             <p:stCondLst>
-                              <p:cond delay="200"/>
+                              <p:cond delay="300"/>
                             </p:stCondLst>
                             <p:childTnLst>
                               <p:par>
-                                <p:cTn id="10" presetID="2" presetClass="exit" presetSubtype="6" fill="hold" nodeType="afterEffect">
+                                <p:cTn id="10" presetID="2" presetClass="entr" presetSubtype="8" fill="hold" nodeType="afterEffect">
                                   <p:stCondLst>
-                                    <p:cond delay="1000"/>
+                                    <p:cond delay="0"/>
                                   </p:stCondLst>
                                   <p:childTnLst>
+                                    <p:set>
+                                      <p:cBhvr>
+                                        <p:cTn id="11" dur="1" fill="hold">
+                                          <p:stCondLst>
+                                            <p:cond delay="0"/>
+                                          </p:stCondLst>
+                                        </p:cTn>
+                                        <p:tgtEl>
+                                          <p:spTgt spid="5"/>
+                                        </p:tgtEl>
+                                        <p:attrNameLst>
+                                          <p:attrName>style.visibility</p:attrName>
+                                        </p:attrNameLst>
+                                      </p:cBhvr>
+                                      <p:to>
+                                        <p:strVal val="visible"/>
+                                      </p:to>
+                                    </p:set>
                                     <p:anim calcmode="lin" valueType="num">
                                       <p:cBhvr additive="base">
-                                        <p:cTn id="11" dur="500"/>
-                                        <p:tgtEl>
-                                          <p:spTgt spid="6"/>
+                                        <p:cTn id="12" dur="300" fill="hold"/>
+                                        <p:tgtEl>
+                                          <p:spTgt spid="5"/>
                                         </p:tgtEl>
                                         <p:attrNameLst>
                                           <p:attrName>ppt_x</p:attrName>
@@ -9696,21 +10426,21 @@
                                       <p:tavLst>
                                         <p:tav tm="0">
                                           <p:val>
-                                            <p:strVal val="ppt_x"/>
+                                            <p:strVal val="0-#ppt_w/2"/>
                                           </p:val>
                                         </p:tav>
                                         <p:tav tm="100000">
                                           <p:val>
-                                            <p:strVal val="1+ppt_w/2"/>
+                                            <p:strVal val="#ppt_x"/>
                                           </p:val>
                                         </p:tav>
                                       </p:tavLst>
                                     </p:anim>
                                     <p:anim calcmode="lin" valueType="num">
                                       <p:cBhvr additive="base">
-                                        <p:cTn id="12" dur="500"/>
-                                        <p:tgtEl>
-                                          <p:spTgt spid="6"/>
+                                        <p:cTn id="13" dur="300" fill="hold"/>
+                                        <p:tgtEl>
+                                          <p:spTgt spid="5"/>
                                         </p:tgtEl>
                                         <p:attrNameLst>
                                           <p:attrName>ppt_y</p:attrName>
@@ -9719,61 +10449,56 @@
                                       <p:tavLst>
                                         <p:tav tm="0">
                                           <p:val>
-                                            <p:strVal val="ppt_y"/>
+                                            <p:strVal val="#ppt_y"/>
                                           </p:val>
                                         </p:tav>
                                         <p:tav tm="100000">
                                           <p:val>
-                                            <p:strVal val="1+ppt_h/2"/>
+                                            <p:strVal val="#ppt_y"/>
                                           </p:val>
                                         </p:tav>
                                       </p:tavLst>
                                     </p:anim>
-                                    <p:set>
-                                      <p:cBhvr>
-                                        <p:cTn id="13" dur="1" fill="hold">
-                                          <p:stCondLst>
-                                            <p:cond delay="499"/>
-                                          </p:stCondLst>
-                                        </p:cTn>
-                                        <p:tgtEl>
-                                          <p:spTgt spid="6"/>
-                                        </p:tgtEl>
-                                        <p:attrNameLst>
-                                          <p:attrName>style.visibility</p:attrName>
-                                        </p:attrNameLst>
-                                      </p:cBhvr>
-                                      <p:to>
-                                        <p:strVal val="hidden"/>
-                                      </p:to>
-                                    </p:set>
                                   </p:childTnLst>
                                 </p:cTn>
                               </p:par>
                             </p:childTnLst>
                           </p:cTn>
                         </p:par>
+                      </p:childTnLst>
+                    </p:cTn>
+                  </p:par>
+                  <p:par>
+                    <p:cTn id="14" fill="hold">
+                      <p:stCondLst>
+                        <p:cond delay="indefinite"/>
+                      </p:stCondLst>
+                      <p:childTnLst>
                         <p:par>
-                          <p:cTn id="14" fill="hold">
+                          <p:cTn id="15" fill="hold">
                             <p:stCondLst>
-                              <p:cond delay="1700"/>
+                              <p:cond delay="0"/>
                             </p:stCondLst>
                             <p:childTnLst>
                               <p:par>
-                                <p:cTn id="15" presetID="53" presetClass="entr" presetSubtype="16" fill="hold" nodeType="afterEffect">
+                                <p:cTn id="16" presetID="2" presetClass="entr" presetSubtype="4" fill="hold" grpId="0" nodeType="clickEffect">
                                   <p:stCondLst>
-                                    <p:cond delay="250"/>
+                                    <p:cond delay="0"/>
                                   </p:stCondLst>
                                   <p:childTnLst>
                                     <p:set>
                                       <p:cBhvr>
-                                        <p:cTn id="16" dur="1" fill="hold">
+                                        <p:cTn id="17" dur="1" fill="hold">
                                           <p:stCondLst>
                                             <p:cond delay="0"/>
                                           </p:stCondLst>
                                         </p:cTn>
                                         <p:tgtEl>
-                                          <p:spTgt spid="1026"/>
+                                          <p:spTgt spid="6">
+                                            <p:txEl>
+                                              <p:pRg st="0" end="0"/>
+                                            </p:txEl>
+                                          </p:spTgt>
                                         </p:tgtEl>
                                         <p:attrNameLst>
                                           <p:attrName>style.visibility</p:attrName>
@@ -9784,86 +10509,99 @@
                                       </p:to>
                                     </p:set>
                                     <p:anim calcmode="lin" valueType="num">
-                                      <p:cBhvr>
-                                        <p:cTn id="17" dur="200" fill="hold"/>
-                                        <p:tgtEl>
-                                          <p:spTgt spid="1026"/>
-                                        </p:tgtEl>
-                                        <p:attrNameLst>
-                                          <p:attrName>ppt_w</p:attrName>
+                                      <p:cBhvr additive="base">
+                                        <p:cTn id="18" dur="300" fill="hold"/>
+                                        <p:tgtEl>
+                                          <p:spTgt spid="6">
+                                            <p:txEl>
+                                              <p:pRg st="0" end="0"/>
+                                            </p:txEl>
+                                          </p:spTgt>
+                                        </p:tgtEl>
+                                        <p:attrNameLst>
+                                          <p:attrName>ppt_x</p:attrName>
                                         </p:attrNameLst>
                                       </p:cBhvr>
                                       <p:tavLst>
                                         <p:tav tm="0">
                                           <p:val>
-                                            <p:fltVal val="0"/>
+                                            <p:strVal val="#ppt_x"/>
                                           </p:val>
                                         </p:tav>
                                         <p:tav tm="100000">
                                           <p:val>
-                                            <p:strVal val="#ppt_w"/>
+                                            <p:strVal val="#ppt_x"/>
                                           </p:val>
                                         </p:tav>
                                       </p:tavLst>
                                     </p:anim>
                                     <p:anim calcmode="lin" valueType="num">
-                                      <p:cBhvr>
-                                        <p:cTn id="18" dur="200" fill="hold"/>
-                                        <p:tgtEl>
-                                          <p:spTgt spid="1026"/>
-                                        </p:tgtEl>
-                                        <p:attrNameLst>
-                                          <p:attrName>ppt_h</p:attrName>
+                                      <p:cBhvr additive="base">
+                                        <p:cTn id="19" dur="300" fill="hold"/>
+                                        <p:tgtEl>
+                                          <p:spTgt spid="6">
+                                            <p:txEl>
+                                              <p:pRg st="0" end="0"/>
+                                            </p:txEl>
+                                          </p:spTgt>
+                                        </p:tgtEl>
+                                        <p:attrNameLst>
+                                          <p:attrName>ppt_y</p:attrName>
                                         </p:attrNameLst>
                                       </p:cBhvr>
                                       <p:tavLst>
                                         <p:tav tm="0">
                                           <p:val>
-                                            <p:fltVal val="0"/>
+                                            <p:strVal val="1+#ppt_h/2"/>
                                           </p:val>
                                         </p:tav>
                                         <p:tav tm="100000">
                                           <p:val>
-                                            <p:strVal val="#ppt_h"/>
+                                            <p:strVal val="#ppt_y"/>
                                           </p:val>
                                         </p:tav>
                                       </p:tavLst>
                                     </p:anim>
-                                    <p:animEffect transition="in" filter="fade">
-                                      <p:cBhvr>
-                                        <p:cTn id="19" dur="200"/>
-                                        <p:tgtEl>
-                                          <p:spTgt spid="1026"/>
-                                        </p:tgtEl>
-                                      </p:cBhvr>
-                                    </p:animEffect>
                                   </p:childTnLst>
                                 </p:cTn>
                               </p:par>
                             </p:childTnLst>
                           </p:cTn>
                         </p:par>
+                      </p:childTnLst>
+                    </p:cTn>
+                  </p:par>
+                  <p:par>
+                    <p:cTn id="20" fill="hold">
+                      <p:stCondLst>
+                        <p:cond delay="indefinite"/>
+                      </p:stCondLst>
+                      <p:childTnLst>
                         <p:par>
-                          <p:cTn id="20" fill="hold">
+                          <p:cTn id="21" fill="hold">
                             <p:stCondLst>
-                              <p:cond delay="2150"/>
+                              <p:cond delay="0"/>
                             </p:stCondLst>
                             <p:childTnLst>
                               <p:par>
-                                <p:cTn id="21" presetID="53" presetClass="entr" presetSubtype="16" fill="hold" grpId="0" nodeType="afterEffect">
+                                <p:cTn id="22" presetID="2" presetClass="entr" presetSubtype="4" fill="hold" grpId="0" nodeType="clickEffect">
                                   <p:stCondLst>
-                                    <p:cond delay="250"/>
+                                    <p:cond delay="0"/>
                                   </p:stCondLst>
                                   <p:childTnLst>
                                     <p:set>
                                       <p:cBhvr>
-                                        <p:cTn id="22" dur="1" fill="hold">
+                                        <p:cTn id="23" dur="1" fill="hold">
                                           <p:stCondLst>
                                             <p:cond delay="0"/>
                                           </p:stCondLst>
                                         </p:cTn>
                                         <p:tgtEl>
-                                          <p:spTgt spid="4"/>
+                                          <p:spTgt spid="6">
+                                            <p:txEl>
+                                              <p:pRg st="1" end="1"/>
+                                            </p:txEl>
+                                          </p:spTgt>
                                         </p:tgtEl>
                                         <p:attrNameLst>
                                           <p:attrName>style.visibility</p:attrName>
@@ -9874,59 +10612,265 @@
                                       </p:to>
                                     </p:set>
                                     <p:anim calcmode="lin" valueType="num">
-                                      <p:cBhvr>
-                                        <p:cTn id="23" dur="200" fill="hold"/>
-                                        <p:tgtEl>
-                                          <p:spTgt spid="4"/>
-                                        </p:tgtEl>
-                                        <p:attrNameLst>
-                                          <p:attrName>ppt_w</p:attrName>
+                                      <p:cBhvr additive="base">
+                                        <p:cTn id="24" dur="300" fill="hold"/>
+                                        <p:tgtEl>
+                                          <p:spTgt spid="6">
+                                            <p:txEl>
+                                              <p:pRg st="1" end="1"/>
+                                            </p:txEl>
+                                          </p:spTgt>
+                                        </p:tgtEl>
+                                        <p:attrNameLst>
+                                          <p:attrName>ppt_x</p:attrName>
                                         </p:attrNameLst>
                                       </p:cBhvr>
                                       <p:tavLst>
                                         <p:tav tm="0">
                                           <p:val>
-                                            <p:fltVal val="0"/>
+                                            <p:strVal val="#ppt_x"/>
                                           </p:val>
                                         </p:tav>
                                         <p:tav tm="100000">
                                           <p:val>
-                                            <p:strVal val="#ppt_w"/>
+                                            <p:strVal val="#ppt_x"/>
                                           </p:val>
                                         </p:tav>
                                       </p:tavLst>
                                     </p:anim>
                                     <p:anim calcmode="lin" valueType="num">
-                                      <p:cBhvr>
-                                        <p:cTn id="24" dur="200" fill="hold"/>
-                                        <p:tgtEl>
-                                          <p:spTgt spid="4"/>
-                                        </p:tgtEl>
-                                        <p:attrNameLst>
-                                          <p:attrName>ppt_h</p:attrName>
+                                      <p:cBhvr additive="base">
+                                        <p:cTn id="25" dur="300" fill="hold"/>
+                                        <p:tgtEl>
+                                          <p:spTgt spid="6">
+                                            <p:txEl>
+                                              <p:pRg st="1" end="1"/>
+                                            </p:txEl>
+                                          </p:spTgt>
+                                        </p:tgtEl>
+                                        <p:attrNameLst>
+                                          <p:attrName>ppt_y</p:attrName>
                                         </p:attrNameLst>
                                       </p:cBhvr>
                                       <p:tavLst>
                                         <p:tav tm="0">
                                           <p:val>
-                                            <p:fltVal val="0"/>
+                                            <p:strVal val="1+#ppt_h/2"/>
                                           </p:val>
                                         </p:tav>
                                         <p:tav tm="100000">
                                           <p:val>
-                                            <p:strVal val="#ppt_h"/>
+                                            <p:strVal val="#ppt_y"/>
                                           </p:val>
                                         </p:tav>
                                       </p:tavLst>
                                     </p:anim>
-                                    <p:animEffect transition="in" filter="fade">
+                                  </p:childTnLst>
+                                </p:cTn>
+                              </p:par>
+                            </p:childTnLst>
+                          </p:cTn>
+                        </p:par>
+                      </p:childTnLst>
+                    </p:cTn>
+                  </p:par>
+                  <p:par>
+                    <p:cTn id="26" fill="hold">
+                      <p:stCondLst>
+                        <p:cond delay="indefinite"/>
+                      </p:stCondLst>
+                      <p:childTnLst>
+                        <p:par>
+                          <p:cTn id="27" fill="hold">
+                            <p:stCondLst>
+                              <p:cond delay="0"/>
+                            </p:stCondLst>
+                            <p:childTnLst>
+                              <p:par>
+                                <p:cTn id="28" presetID="2" presetClass="entr" presetSubtype="4" fill="hold" grpId="0" nodeType="clickEffect">
+                                  <p:stCondLst>
+                                    <p:cond delay="0"/>
+                                  </p:stCondLst>
+                                  <p:childTnLst>
+                                    <p:set>
                                       <p:cBhvr>
-                                        <p:cTn id="25" dur="200"/>
-                                        <p:tgtEl>
-                                          <p:spTgt spid="4"/>
-                                        </p:tgtEl>
-                                      </p:cBhvr>
-                                    </p:animEffect>
+                                        <p:cTn id="29" dur="1" fill="hold">
+                                          <p:stCondLst>
+                                            <p:cond delay="0"/>
+                                          </p:stCondLst>
+                                        </p:cTn>
+                                        <p:tgtEl>
+                                          <p:spTgt spid="6">
+                                            <p:txEl>
+                                              <p:pRg st="2" end="2"/>
+                                            </p:txEl>
+                                          </p:spTgt>
+                                        </p:tgtEl>
+                                        <p:attrNameLst>
+                                          <p:attrName>style.visibility</p:attrName>
+                                        </p:attrNameLst>
+                                      </p:cBhvr>
+                                      <p:to>
+                                        <p:strVal val="visible"/>
+                                      </p:to>
+                                    </p:set>
+                                    <p:anim calcmode="lin" valueType="num">
+                                      <p:cBhvr additive="base">
+                                        <p:cTn id="30" dur="300" fill="hold"/>
+                                        <p:tgtEl>
+                                          <p:spTgt spid="6">
+                                            <p:txEl>
+                                              <p:pRg st="2" end="2"/>
+                                            </p:txEl>
+                                          </p:spTgt>
+                                        </p:tgtEl>
+                                        <p:attrNameLst>
+                                          <p:attrName>ppt_x</p:attrName>
+                                        </p:attrNameLst>
+                                      </p:cBhvr>
+                                      <p:tavLst>
+                                        <p:tav tm="0">
+                                          <p:val>
+                                            <p:strVal val="#ppt_x"/>
+                                          </p:val>
+                                        </p:tav>
+                                        <p:tav tm="100000">
+                                          <p:val>
+                                            <p:strVal val="#ppt_x"/>
+                                          </p:val>
+                                        </p:tav>
+                                      </p:tavLst>
+                                    </p:anim>
+                                    <p:anim calcmode="lin" valueType="num">
+                                      <p:cBhvr additive="base">
+                                        <p:cTn id="31" dur="300" fill="hold"/>
+                                        <p:tgtEl>
+                                          <p:spTgt spid="6">
+                                            <p:txEl>
+                                              <p:pRg st="2" end="2"/>
+                                            </p:txEl>
+                                          </p:spTgt>
+                                        </p:tgtEl>
+                                        <p:attrNameLst>
+                                          <p:attrName>ppt_y</p:attrName>
+                                        </p:attrNameLst>
+                                      </p:cBhvr>
+                                      <p:tavLst>
+                                        <p:tav tm="0">
+                                          <p:val>
+                                            <p:strVal val="1+#ppt_h/2"/>
+                                          </p:val>
+                                        </p:tav>
+                                        <p:tav tm="100000">
+                                          <p:val>
+                                            <p:strVal val="#ppt_y"/>
+                                          </p:val>
+                                        </p:tav>
+                                      </p:tavLst>
+                                    </p:anim>
+                                  </p:childTnLst>
+                                </p:cTn>
+                              </p:par>
+                            </p:childTnLst>
+                          </p:cTn>
+                        </p:par>
+                      </p:childTnLst>
+                    </p:cTn>
+                  </p:par>
+                  <p:par>
+                    <p:cTn id="32" fill="hold">
+                      <p:stCondLst>
+                        <p:cond delay="indefinite"/>
+                      </p:stCondLst>
+                      <p:childTnLst>
+                        <p:par>
+                          <p:cTn id="33" fill="hold">
+                            <p:stCondLst>
+                              <p:cond delay="0"/>
+                            </p:stCondLst>
+                            <p:childTnLst>
+                              <p:par>
+                                <p:cTn id="34" presetID="2" presetClass="entr" presetSubtype="4" fill="hold" grpId="0" nodeType="clickEffect">
+                                  <p:stCondLst>
+                                    <p:cond delay="0"/>
+                                  </p:stCondLst>
+                                  <p:childTnLst>
+                                    <p:set>
+                                      <p:cBhvr>
+                                        <p:cTn id="35" dur="1" fill="hold">
+                                          <p:stCondLst>
+                                            <p:cond delay="0"/>
+                                          </p:stCondLst>
+                                        </p:cTn>
+                                        <p:tgtEl>
+                                          <p:spTgt spid="6">
+                                            <p:txEl>
+                                              <p:pRg st="3" end="3"/>
+                                            </p:txEl>
+                                          </p:spTgt>
+                                        </p:tgtEl>
+                                        <p:attrNameLst>
+                                          <p:attrName>style.visibility</p:attrName>
+                                        </p:attrNameLst>
+                                      </p:cBhvr>
+                                      <p:to>
+                                        <p:strVal val="visible"/>
+                                      </p:to>
+                                    </p:set>
+                                    <p:anim calcmode="lin" valueType="num">
+                                      <p:cBhvr additive="base">
+                                        <p:cTn id="36" dur="300" fill="hold"/>
+                                        <p:tgtEl>
+                                          <p:spTgt spid="6">
+                                            <p:txEl>
+                                              <p:pRg st="3" end="3"/>
+                                            </p:txEl>
+                                          </p:spTgt>
+                                        </p:tgtEl>
+                                        <p:attrNameLst>
+                                          <p:attrName>ppt_x</p:attrName>
+                                        </p:attrNameLst>
+                                      </p:cBhvr>
+                                      <p:tavLst>
+                                        <p:tav tm="0">
+                                          <p:val>
+                                            <p:strVal val="#ppt_x"/>
+                                          </p:val>
+                                        </p:tav>
+                                        <p:tav tm="100000">
+                                          <p:val>
+                                            <p:strVal val="#ppt_x"/>
+                                          </p:val>
+                                        </p:tav>
+                                      </p:tavLst>
+                                    </p:anim>
+                                    <p:anim calcmode="lin" valueType="num">
+                                      <p:cBhvr additive="base">
+                                        <p:cTn id="37" dur="300" fill="hold"/>
+                                        <p:tgtEl>
+                                          <p:spTgt spid="6">
+                                            <p:txEl>
+                                              <p:pRg st="3" end="3"/>
+                                            </p:txEl>
+                                          </p:spTgt>
+                                        </p:tgtEl>
+                                        <p:attrNameLst>
+                                          <p:attrName>ppt_y</p:attrName>
+                                        </p:attrNameLst>
+                                      </p:cBhvr>
+                                      <p:tavLst>
+                                        <p:tav tm="0">
+                                          <p:val>
+                                            <p:strVal val="1+#ppt_h/2"/>
+                                          </p:val>
+                                        </p:tav>
+                                        <p:tav tm="100000">
+                                          <p:val>
+                                            <p:strVal val="#ppt_y"/>
+                                          </p:val>
+                                        </p:tav>
+                                      </p:tavLst>
+                                    </p:anim>
                                   </p:childTnLst>
                                 </p:cTn>
                               </p:par>
@@ -9958,8 +10902,8 @@
       </p:par>
     </p:tnLst>
     <p:bldLst>
+      <p:bldP spid="6" grpId="0" build="p"/>
       <p:bldP spid="7" grpId="0" animBg="1"/>
-      <p:bldP spid="4" grpId="0" animBg="1"/>
     </p:bldLst>
   </p:timing>
 </p:sld>

</xml_diff>